<commit_message>
Add explanation of descriptor based drivers as well as zero copy.
</commit_message>
<xml_diff>
--- a/undergraduate/lectures/devices.pptx
+++ b/undergraduate/lectures/devices.pptx
@@ -5,7 +5,7 @@
     <p:sldMasterId id="2147483786" r:id="rId1"/>
   </p:sldMasterIdLst>
   <p:notesMasterIdLst>
-    <p:notesMasterId r:id="rId11"/>
+    <p:notesMasterId r:id="rId15"/>
   </p:notesMasterIdLst>
   <p:sldIdLst>
     <p:sldId id="256" r:id="rId2"/>
@@ -17,6 +17,10 @@
     <p:sldId id="260" r:id="rId8"/>
     <p:sldId id="261" r:id="rId9"/>
     <p:sldId id="262" r:id="rId10"/>
+    <p:sldId id="265" r:id="rId11"/>
+    <p:sldId id="266" r:id="rId12"/>
+    <p:sldId id="267" r:id="rId13"/>
+    <p:sldId id="268" r:id="rId14"/>
   </p:sldIdLst>
   <p:sldSz cx="12192000" cy="6858000"/>
   <p:notesSz cx="6858000" cy="9144000"/>
@@ -4462,6 +4466,4501 @@
 </p:sld>
 </file>
 
+<file path=ppt/slides/slide10.xml><?xml version="1.0" encoding="utf-8"?>
+<p:sld xmlns:a="http://schemas.openxmlformats.org/drawingml/2006/main" xmlns:r="http://schemas.openxmlformats.org/officeDocument/2006/relationships" xmlns:p="http://schemas.openxmlformats.org/presentationml/2006/main">
+  <p:cSld>
+    <p:spTree>
+      <p:nvGrpSpPr>
+        <p:cNvPr id="1" name=""/>
+        <p:cNvGrpSpPr/>
+        <p:nvPr/>
+      </p:nvGrpSpPr>
+      <p:grpSpPr>
+        <a:xfrm>
+          <a:off x="0" y="0"/>
+          <a:ext cx="0" cy="0"/>
+          <a:chOff x="0" y="0"/>
+          <a:chExt cx="0" cy="0"/>
+        </a:xfrm>
+      </p:grpSpPr>
+      <p:sp>
+        <p:nvSpPr>
+          <p:cNvPr id="2" name="Title 1"/>
+          <p:cNvSpPr>
+            <a:spLocks noGrp="1"/>
+          </p:cNvSpPr>
+          <p:nvPr>
+            <p:ph type="title"/>
+          </p:nvPr>
+        </p:nvSpPr>
+        <p:spPr/>
+        <p:txBody>
+          <a:bodyPr/>
+          <a:lstStyle/>
+          <a:p>
+            <a:r>
+              <a:rPr lang="en-US" dirty="0" smtClean="0"/>
+              <a:t>Meeting in the Middle</a:t>
+            </a:r>
+            <a:endParaRPr lang="en-US" dirty="0"/>
+          </a:p>
+        </p:txBody>
+      </p:sp>
+      <p:sp>
+        <p:nvSpPr>
+          <p:cNvPr id="6" name="Content Placeholder 5"/>
+          <p:cNvSpPr>
+            <a:spLocks noGrp="1"/>
+          </p:cNvSpPr>
+          <p:nvPr>
+            <p:ph idx="1"/>
+          </p:nvPr>
+        </p:nvSpPr>
+        <p:spPr/>
+        <p:txBody>
+          <a:bodyPr/>
+          <a:lstStyle/>
+          <a:p>
+            <a:r>
+              <a:rPr lang="en-US" dirty="0" smtClean="0"/>
+              <a:t>Producer/Consumer Model</a:t>
+            </a:r>
+          </a:p>
+          <a:p>
+            <a:r>
+              <a:rPr lang="en-US" dirty="0" smtClean="0"/>
+              <a:t>Doorbells</a:t>
+            </a:r>
+          </a:p>
+          <a:p>
+            <a:r>
+              <a:rPr lang="en-US" dirty="0" smtClean="0"/>
+              <a:t>Mailboxes</a:t>
+            </a:r>
+          </a:p>
+          <a:p>
+            <a:r>
+              <a:rPr lang="en-US" dirty="0" err="1" smtClean="0"/>
+              <a:t>Syncronization</a:t>
+            </a:r>
+            <a:endParaRPr lang="en-US" dirty="0" smtClean="0"/>
+          </a:p>
+          <a:p>
+            <a:r>
+              <a:rPr lang="en-US" dirty="0" smtClean="0"/>
+              <a:t>Off by 2</a:t>
+            </a:r>
+            <a:endParaRPr lang="en-US" dirty="0"/>
+          </a:p>
+        </p:txBody>
+      </p:sp>
+      <p:sp>
+        <p:nvSpPr>
+          <p:cNvPr id="3" name="Date Placeholder 2"/>
+          <p:cNvSpPr>
+            <a:spLocks noGrp="1"/>
+          </p:cNvSpPr>
+          <p:nvPr>
+            <p:ph type="dt" sz="half" idx="10"/>
+          </p:nvPr>
+        </p:nvSpPr>
+        <p:spPr/>
+        <p:txBody>
+          <a:bodyPr/>
+          <a:lstStyle/>
+          <a:p>
+            <a:fld id="{9FC8F57C-E466-5D4A-8BA1-0F2DC96E6599}" type="datetime1">
+              <a:rPr lang="en-US" smtClean="0"/>
+              <a:t>2/4/17</a:t>
+            </a:fld>
+            <a:endParaRPr lang="en-US"/>
+          </a:p>
+        </p:txBody>
+      </p:sp>
+      <p:sp>
+        <p:nvSpPr>
+          <p:cNvPr id="4" name="Footer Placeholder 3"/>
+          <p:cNvSpPr>
+            <a:spLocks noGrp="1"/>
+          </p:cNvSpPr>
+          <p:nvPr>
+            <p:ph type="ftr" sz="quarter" idx="11"/>
+          </p:nvPr>
+        </p:nvSpPr>
+        <p:spPr/>
+        <p:txBody>
+          <a:bodyPr/>
+          <a:lstStyle/>
+          <a:p>
+            <a:r>
+              <a:rPr lang="en-US" smtClean="0"/>
+              <a:t>Developing Products with FreeBSD</a:t>
+            </a:r>
+            <a:endParaRPr lang="en-US"/>
+          </a:p>
+        </p:txBody>
+      </p:sp>
+      <p:sp>
+        <p:nvSpPr>
+          <p:cNvPr id="5" name="Slide Number Placeholder 4"/>
+          <p:cNvSpPr>
+            <a:spLocks noGrp="1"/>
+          </p:cNvSpPr>
+          <p:nvPr>
+            <p:ph type="sldNum" sz="quarter" idx="12"/>
+          </p:nvPr>
+        </p:nvSpPr>
+        <p:spPr/>
+        <p:txBody>
+          <a:bodyPr/>
+          <a:lstStyle/>
+          <a:p>
+            <a:fld id="{699C44C4-0FAD-8046-A5C4-05AB318FA424}" type="slidenum">
+              <a:rPr lang="en-US" smtClean="0"/>
+              <a:t>10</a:t>
+            </a:fld>
+            <a:endParaRPr lang="en-US"/>
+          </a:p>
+        </p:txBody>
+      </p:sp>
+    </p:spTree>
+    <p:extLst>
+      <p:ext uri="{BB962C8B-B14F-4D97-AF65-F5344CB8AC3E}">
+        <p14:creationId xmlns:p14="http://schemas.microsoft.com/office/powerpoint/2010/main" val="1304884495"/>
+      </p:ext>
+    </p:extLst>
+  </p:cSld>
+  <p:clrMapOvr>
+    <a:masterClrMapping/>
+  </p:clrMapOvr>
+  <p:timing>
+    <p:tnLst>
+      <p:par>
+        <p:cTn id="1" dur="indefinite" restart="never" nodeType="tmRoot"/>
+      </p:par>
+    </p:tnLst>
+  </p:timing>
+</p:sld>
+</file>
+
+<file path=ppt/slides/slide11.xml><?xml version="1.0" encoding="utf-8"?>
+<p:sld xmlns:a="http://schemas.openxmlformats.org/drawingml/2006/main" xmlns:r="http://schemas.openxmlformats.org/officeDocument/2006/relationships" xmlns:p="http://schemas.openxmlformats.org/presentationml/2006/main">
+  <p:cSld>
+    <p:spTree>
+      <p:nvGrpSpPr>
+        <p:cNvPr id="1" name=""/>
+        <p:cNvGrpSpPr/>
+        <p:nvPr/>
+      </p:nvGrpSpPr>
+      <p:grpSpPr>
+        <a:xfrm>
+          <a:off x="0" y="0"/>
+          <a:ext cx="0" cy="0"/>
+          <a:chOff x="0" y="0"/>
+          <a:chExt cx="0" cy="0"/>
+        </a:xfrm>
+      </p:grpSpPr>
+      <p:sp>
+        <p:nvSpPr>
+          <p:cNvPr id="2" name="Title 1"/>
+          <p:cNvSpPr>
+            <a:spLocks noGrp="1"/>
+          </p:cNvSpPr>
+          <p:nvPr>
+            <p:ph type="title"/>
+          </p:nvPr>
+        </p:nvSpPr>
+        <p:spPr/>
+        <p:txBody>
+          <a:bodyPr/>
+          <a:lstStyle/>
+          <a:p>
+            <a:r>
+              <a:rPr lang="en-US" dirty="0" smtClean="0"/>
+              <a:t>Producer and Consumer</a:t>
+            </a:r>
+            <a:endParaRPr lang="en-US" dirty="0"/>
+          </a:p>
+        </p:txBody>
+      </p:sp>
+      <p:sp>
+        <p:nvSpPr>
+          <p:cNvPr id="4" name="Date Placeholder 3"/>
+          <p:cNvSpPr>
+            <a:spLocks noGrp="1"/>
+          </p:cNvSpPr>
+          <p:nvPr>
+            <p:ph type="dt" sz="half" idx="10"/>
+          </p:nvPr>
+        </p:nvSpPr>
+        <p:spPr/>
+        <p:txBody>
+          <a:bodyPr/>
+          <a:lstStyle/>
+          <a:p>
+            <a:fld id="{BC4AE5AA-C6FF-5A4F-9D02-E3454F0B3602}" type="datetime1">
+              <a:rPr lang="en-US" smtClean="0"/>
+              <a:t>2/4/17</a:t>
+            </a:fld>
+            <a:endParaRPr lang="en-US"/>
+          </a:p>
+        </p:txBody>
+      </p:sp>
+      <p:sp>
+        <p:nvSpPr>
+          <p:cNvPr id="5" name="Footer Placeholder 4"/>
+          <p:cNvSpPr>
+            <a:spLocks noGrp="1"/>
+          </p:cNvSpPr>
+          <p:nvPr>
+            <p:ph type="ftr" sz="quarter" idx="11"/>
+          </p:nvPr>
+        </p:nvSpPr>
+        <p:spPr/>
+        <p:txBody>
+          <a:bodyPr/>
+          <a:lstStyle/>
+          <a:p>
+            <a:r>
+              <a:rPr lang="en-US" smtClean="0"/>
+              <a:t>Developing Products with FreeBSD</a:t>
+            </a:r>
+            <a:endParaRPr lang="en-US" dirty="0"/>
+          </a:p>
+        </p:txBody>
+      </p:sp>
+      <p:sp>
+        <p:nvSpPr>
+          <p:cNvPr id="6" name="Slide Number Placeholder 5"/>
+          <p:cNvSpPr>
+            <a:spLocks noGrp="1"/>
+          </p:cNvSpPr>
+          <p:nvPr>
+            <p:ph type="sldNum" sz="quarter" idx="12"/>
+          </p:nvPr>
+        </p:nvSpPr>
+        <p:spPr/>
+        <p:txBody>
+          <a:bodyPr/>
+          <a:lstStyle/>
+          <a:p>
+            <a:fld id="{699C44C4-0FAD-8046-A5C4-05AB318FA424}" type="slidenum">
+              <a:rPr lang="en-US" smtClean="0"/>
+              <a:t>11</a:t>
+            </a:fld>
+            <a:endParaRPr lang="en-US"/>
+          </a:p>
+        </p:txBody>
+      </p:sp>
+      <p:sp>
+        <p:nvSpPr>
+          <p:cNvPr id="7" name="Rectangle 6"/>
+          <p:cNvSpPr/>
+          <p:nvPr/>
+        </p:nvSpPr>
+        <p:spPr>
+          <a:xfrm>
+            <a:off x="3987210" y="1648045"/>
+            <a:ext cx="1339702" cy="531628"/>
+          </a:xfrm>
+          <a:prstGeom prst="rect">
+            <a:avLst/>
+          </a:prstGeom>
+          <a:solidFill>
+            <a:srgbClr val="00B050"/>
+          </a:solidFill>
+          <a:ln>
+            <a:solidFill>
+              <a:schemeClr val="bg1"/>
+            </a:solidFill>
+          </a:ln>
+        </p:spPr>
+        <p:style>
+          <a:lnRef idx="2">
+            <a:schemeClr val="accent1">
+              <a:shade val="50000"/>
+            </a:schemeClr>
+          </a:lnRef>
+          <a:fillRef idx="1">
+            <a:schemeClr val="accent1"/>
+          </a:fillRef>
+          <a:effectRef idx="0">
+            <a:schemeClr val="accent1"/>
+          </a:effectRef>
+          <a:fontRef idx="minor">
+            <a:schemeClr val="lt1"/>
+          </a:fontRef>
+        </p:style>
+        <p:txBody>
+          <a:bodyPr rtlCol="0" anchor="ctr"/>
+          <a:lstStyle/>
+          <a:p>
+            <a:pPr algn="ctr"/>
+            <a:r>
+              <a:rPr lang="en-US" dirty="0" smtClean="0"/>
+              <a:t>Descriptor</a:t>
+            </a:r>
+            <a:endParaRPr lang="en-US" dirty="0"/>
+          </a:p>
+        </p:txBody>
+      </p:sp>
+      <p:sp>
+        <p:nvSpPr>
+          <p:cNvPr id="8" name="Rectangle 7"/>
+          <p:cNvSpPr/>
+          <p:nvPr/>
+        </p:nvSpPr>
+        <p:spPr>
+          <a:xfrm>
+            <a:off x="6671745" y="1634945"/>
+            <a:ext cx="1339702" cy="531628"/>
+          </a:xfrm>
+          <a:prstGeom prst="rect">
+            <a:avLst/>
+          </a:prstGeom>
+          <a:solidFill>
+            <a:srgbClr val="00B050"/>
+          </a:solidFill>
+          <a:ln>
+            <a:solidFill>
+              <a:schemeClr val="bg1"/>
+            </a:solidFill>
+          </a:ln>
+        </p:spPr>
+        <p:style>
+          <a:lnRef idx="2">
+            <a:schemeClr val="accent1">
+              <a:shade val="50000"/>
+            </a:schemeClr>
+          </a:lnRef>
+          <a:fillRef idx="1">
+            <a:schemeClr val="accent1"/>
+          </a:fillRef>
+          <a:effectRef idx="0">
+            <a:schemeClr val="accent1"/>
+          </a:effectRef>
+          <a:fontRef idx="minor">
+            <a:schemeClr val="lt1"/>
+          </a:fontRef>
+        </p:style>
+        <p:txBody>
+          <a:bodyPr rtlCol="0" anchor="ctr"/>
+          <a:lstStyle/>
+          <a:p>
+            <a:pPr algn="ctr"/>
+            <a:r>
+              <a:rPr lang="en-US" dirty="0" smtClean="0"/>
+              <a:t>Data</a:t>
+            </a:r>
+            <a:endParaRPr lang="en-US" dirty="0"/>
+          </a:p>
+        </p:txBody>
+      </p:sp>
+      <p:sp>
+        <p:nvSpPr>
+          <p:cNvPr id="9" name="Rectangle 8"/>
+          <p:cNvSpPr/>
+          <p:nvPr/>
+        </p:nvSpPr>
+        <p:spPr>
+          <a:xfrm>
+            <a:off x="6671745" y="2166573"/>
+            <a:ext cx="1339702" cy="531628"/>
+          </a:xfrm>
+          <a:prstGeom prst="rect">
+            <a:avLst/>
+          </a:prstGeom>
+          <a:solidFill>
+            <a:srgbClr val="00B050"/>
+          </a:solidFill>
+          <a:ln>
+            <a:solidFill>
+              <a:schemeClr val="bg1"/>
+            </a:solidFill>
+          </a:ln>
+        </p:spPr>
+        <p:style>
+          <a:lnRef idx="2">
+            <a:schemeClr val="accent1">
+              <a:shade val="50000"/>
+            </a:schemeClr>
+          </a:lnRef>
+          <a:fillRef idx="1">
+            <a:schemeClr val="accent1"/>
+          </a:fillRef>
+          <a:effectRef idx="0">
+            <a:schemeClr val="accent1"/>
+          </a:effectRef>
+          <a:fontRef idx="minor">
+            <a:schemeClr val="lt1"/>
+          </a:fontRef>
+        </p:style>
+        <p:txBody>
+          <a:bodyPr rtlCol="0" anchor="ctr"/>
+          <a:lstStyle/>
+          <a:p>
+            <a:pPr algn="ctr"/>
+            <a:r>
+              <a:rPr lang="en-US" dirty="0" smtClean="0"/>
+              <a:t>Data</a:t>
+            </a:r>
+            <a:endParaRPr lang="en-US" dirty="0"/>
+          </a:p>
+        </p:txBody>
+      </p:sp>
+      <p:sp>
+        <p:nvSpPr>
+          <p:cNvPr id="10" name="Rectangle 9"/>
+          <p:cNvSpPr/>
+          <p:nvPr/>
+        </p:nvSpPr>
+        <p:spPr>
+          <a:xfrm>
+            <a:off x="6671745" y="2698201"/>
+            <a:ext cx="1339702" cy="531628"/>
+          </a:xfrm>
+          <a:prstGeom prst="rect">
+            <a:avLst/>
+          </a:prstGeom>
+          <a:solidFill>
+            <a:srgbClr val="00B050"/>
+          </a:solidFill>
+          <a:ln>
+            <a:solidFill>
+              <a:schemeClr val="bg1"/>
+            </a:solidFill>
+          </a:ln>
+        </p:spPr>
+        <p:style>
+          <a:lnRef idx="2">
+            <a:schemeClr val="accent1">
+              <a:shade val="50000"/>
+            </a:schemeClr>
+          </a:lnRef>
+          <a:fillRef idx="1">
+            <a:schemeClr val="accent1"/>
+          </a:fillRef>
+          <a:effectRef idx="0">
+            <a:schemeClr val="accent1"/>
+          </a:effectRef>
+          <a:fontRef idx="minor">
+            <a:schemeClr val="lt1"/>
+          </a:fontRef>
+        </p:style>
+        <p:txBody>
+          <a:bodyPr rtlCol="0" anchor="ctr"/>
+          <a:lstStyle/>
+          <a:p>
+            <a:pPr algn="ctr"/>
+            <a:r>
+              <a:rPr lang="en-US" dirty="0" smtClean="0"/>
+              <a:t>Data</a:t>
+            </a:r>
+            <a:endParaRPr lang="en-US" dirty="0"/>
+          </a:p>
+        </p:txBody>
+      </p:sp>
+      <p:sp>
+        <p:nvSpPr>
+          <p:cNvPr id="11" name="Rectangle 10"/>
+          <p:cNvSpPr/>
+          <p:nvPr/>
+        </p:nvSpPr>
+        <p:spPr>
+          <a:xfrm>
+            <a:off x="6671745" y="3229829"/>
+            <a:ext cx="1339702" cy="531628"/>
+          </a:xfrm>
+          <a:prstGeom prst="rect">
+            <a:avLst/>
+          </a:prstGeom>
+          <a:solidFill>
+            <a:srgbClr val="00B050"/>
+          </a:solidFill>
+          <a:ln>
+            <a:solidFill>
+              <a:schemeClr val="bg1"/>
+            </a:solidFill>
+          </a:ln>
+        </p:spPr>
+        <p:style>
+          <a:lnRef idx="2">
+            <a:schemeClr val="accent1">
+              <a:shade val="50000"/>
+            </a:schemeClr>
+          </a:lnRef>
+          <a:fillRef idx="1">
+            <a:schemeClr val="accent1"/>
+          </a:fillRef>
+          <a:effectRef idx="0">
+            <a:schemeClr val="accent1"/>
+          </a:effectRef>
+          <a:fontRef idx="minor">
+            <a:schemeClr val="lt1"/>
+          </a:fontRef>
+        </p:style>
+        <p:txBody>
+          <a:bodyPr rtlCol="0" anchor="ctr"/>
+          <a:lstStyle/>
+          <a:p>
+            <a:pPr algn="ctr"/>
+            <a:r>
+              <a:rPr lang="en-US" dirty="0" smtClean="0"/>
+              <a:t>Data</a:t>
+            </a:r>
+            <a:endParaRPr lang="en-US" dirty="0"/>
+          </a:p>
+        </p:txBody>
+      </p:sp>
+      <p:sp>
+        <p:nvSpPr>
+          <p:cNvPr id="13" name="Rectangle 12"/>
+          <p:cNvSpPr/>
+          <p:nvPr/>
+        </p:nvSpPr>
+        <p:spPr>
+          <a:xfrm>
+            <a:off x="6671745" y="3761457"/>
+            <a:ext cx="1339702" cy="531628"/>
+          </a:xfrm>
+          <a:prstGeom prst="rect">
+            <a:avLst/>
+          </a:prstGeom>
+          <a:solidFill>
+            <a:srgbClr val="00B050"/>
+          </a:solidFill>
+          <a:ln>
+            <a:solidFill>
+              <a:schemeClr val="bg1"/>
+            </a:solidFill>
+          </a:ln>
+        </p:spPr>
+        <p:style>
+          <a:lnRef idx="2">
+            <a:schemeClr val="accent1">
+              <a:shade val="50000"/>
+            </a:schemeClr>
+          </a:lnRef>
+          <a:fillRef idx="1">
+            <a:schemeClr val="accent1"/>
+          </a:fillRef>
+          <a:effectRef idx="0">
+            <a:schemeClr val="accent1"/>
+          </a:effectRef>
+          <a:fontRef idx="minor">
+            <a:schemeClr val="lt1"/>
+          </a:fontRef>
+        </p:style>
+        <p:txBody>
+          <a:bodyPr rtlCol="0" anchor="ctr"/>
+          <a:lstStyle/>
+          <a:p>
+            <a:pPr algn="ctr"/>
+            <a:r>
+              <a:rPr lang="en-US" dirty="0" smtClean="0"/>
+              <a:t>Data</a:t>
+            </a:r>
+            <a:endParaRPr lang="en-US" dirty="0"/>
+          </a:p>
+        </p:txBody>
+      </p:sp>
+      <p:sp>
+        <p:nvSpPr>
+          <p:cNvPr id="14" name="Rectangle 13"/>
+          <p:cNvSpPr/>
+          <p:nvPr/>
+        </p:nvSpPr>
+        <p:spPr>
+          <a:xfrm>
+            <a:off x="6671745" y="4293085"/>
+            <a:ext cx="1339702" cy="531628"/>
+          </a:xfrm>
+          <a:prstGeom prst="rect">
+            <a:avLst/>
+          </a:prstGeom>
+          <a:solidFill>
+            <a:srgbClr val="00B050"/>
+          </a:solidFill>
+          <a:ln>
+            <a:solidFill>
+              <a:schemeClr val="bg1"/>
+            </a:solidFill>
+          </a:ln>
+        </p:spPr>
+        <p:style>
+          <a:lnRef idx="2">
+            <a:schemeClr val="accent1">
+              <a:shade val="50000"/>
+            </a:schemeClr>
+          </a:lnRef>
+          <a:fillRef idx="1">
+            <a:schemeClr val="accent1"/>
+          </a:fillRef>
+          <a:effectRef idx="0">
+            <a:schemeClr val="accent1"/>
+          </a:effectRef>
+          <a:fontRef idx="minor">
+            <a:schemeClr val="lt1"/>
+          </a:fontRef>
+        </p:style>
+        <p:txBody>
+          <a:bodyPr rtlCol="0" anchor="ctr"/>
+          <a:lstStyle/>
+          <a:p>
+            <a:pPr algn="ctr"/>
+            <a:r>
+              <a:rPr lang="en-US" dirty="0" smtClean="0"/>
+              <a:t>Data</a:t>
+            </a:r>
+            <a:endParaRPr lang="en-US" dirty="0"/>
+          </a:p>
+        </p:txBody>
+      </p:sp>
+      <p:sp>
+        <p:nvSpPr>
+          <p:cNvPr id="15" name="Rectangle 14"/>
+          <p:cNvSpPr/>
+          <p:nvPr/>
+        </p:nvSpPr>
+        <p:spPr>
+          <a:xfrm>
+            <a:off x="6671745" y="4824713"/>
+            <a:ext cx="1339702" cy="531628"/>
+          </a:xfrm>
+          <a:prstGeom prst="rect">
+            <a:avLst/>
+          </a:prstGeom>
+          <a:solidFill>
+            <a:srgbClr val="00B050"/>
+          </a:solidFill>
+          <a:ln>
+            <a:solidFill>
+              <a:schemeClr val="bg1"/>
+            </a:solidFill>
+          </a:ln>
+        </p:spPr>
+        <p:style>
+          <a:lnRef idx="2">
+            <a:schemeClr val="accent1">
+              <a:shade val="50000"/>
+            </a:schemeClr>
+          </a:lnRef>
+          <a:fillRef idx="1">
+            <a:schemeClr val="accent1"/>
+          </a:fillRef>
+          <a:effectRef idx="0">
+            <a:schemeClr val="accent1"/>
+          </a:effectRef>
+          <a:fontRef idx="minor">
+            <a:schemeClr val="lt1"/>
+          </a:fontRef>
+        </p:style>
+        <p:txBody>
+          <a:bodyPr rtlCol="0" anchor="ctr"/>
+          <a:lstStyle/>
+          <a:p>
+            <a:pPr algn="ctr"/>
+            <a:r>
+              <a:rPr lang="en-US" dirty="0" smtClean="0"/>
+              <a:t>Data</a:t>
+            </a:r>
+            <a:endParaRPr lang="en-US" dirty="0"/>
+          </a:p>
+        </p:txBody>
+      </p:sp>
+      <p:sp>
+        <p:nvSpPr>
+          <p:cNvPr id="16" name="Rectangle 15"/>
+          <p:cNvSpPr/>
+          <p:nvPr/>
+        </p:nvSpPr>
+        <p:spPr>
+          <a:xfrm>
+            <a:off x="6671745" y="5356341"/>
+            <a:ext cx="1339702" cy="531628"/>
+          </a:xfrm>
+          <a:prstGeom prst="rect">
+            <a:avLst/>
+          </a:prstGeom>
+          <a:solidFill>
+            <a:srgbClr val="00B050"/>
+          </a:solidFill>
+          <a:ln>
+            <a:solidFill>
+              <a:schemeClr val="bg1"/>
+            </a:solidFill>
+          </a:ln>
+        </p:spPr>
+        <p:style>
+          <a:lnRef idx="2">
+            <a:schemeClr val="accent1">
+              <a:shade val="50000"/>
+            </a:schemeClr>
+          </a:lnRef>
+          <a:fillRef idx="1">
+            <a:schemeClr val="accent1"/>
+          </a:fillRef>
+          <a:effectRef idx="0">
+            <a:schemeClr val="accent1"/>
+          </a:effectRef>
+          <a:fontRef idx="minor">
+            <a:schemeClr val="lt1"/>
+          </a:fontRef>
+        </p:style>
+        <p:txBody>
+          <a:bodyPr rtlCol="0" anchor="ctr"/>
+          <a:lstStyle/>
+          <a:p>
+            <a:pPr algn="ctr"/>
+            <a:r>
+              <a:rPr lang="en-US" dirty="0" smtClean="0"/>
+              <a:t>Data</a:t>
+            </a:r>
+            <a:endParaRPr lang="en-US" dirty="0"/>
+          </a:p>
+        </p:txBody>
+      </p:sp>
+      <p:sp>
+        <p:nvSpPr>
+          <p:cNvPr id="18" name="Rectangle 17"/>
+          <p:cNvSpPr/>
+          <p:nvPr/>
+        </p:nvSpPr>
+        <p:spPr>
+          <a:xfrm>
+            <a:off x="3987210" y="2179673"/>
+            <a:ext cx="1339702" cy="531628"/>
+          </a:xfrm>
+          <a:prstGeom prst="rect">
+            <a:avLst/>
+          </a:prstGeom>
+          <a:solidFill>
+            <a:srgbClr val="00B050"/>
+          </a:solidFill>
+          <a:ln>
+            <a:solidFill>
+              <a:schemeClr val="bg1"/>
+            </a:solidFill>
+          </a:ln>
+        </p:spPr>
+        <p:style>
+          <a:lnRef idx="2">
+            <a:schemeClr val="accent1">
+              <a:shade val="50000"/>
+            </a:schemeClr>
+          </a:lnRef>
+          <a:fillRef idx="1">
+            <a:schemeClr val="accent1"/>
+          </a:fillRef>
+          <a:effectRef idx="0">
+            <a:schemeClr val="accent1"/>
+          </a:effectRef>
+          <a:fontRef idx="minor">
+            <a:schemeClr val="lt1"/>
+          </a:fontRef>
+        </p:style>
+        <p:txBody>
+          <a:bodyPr rtlCol="0" anchor="ctr"/>
+          <a:lstStyle/>
+          <a:p>
+            <a:pPr algn="ctr"/>
+            <a:r>
+              <a:rPr lang="en-US" dirty="0" smtClean="0"/>
+              <a:t>Descriptor</a:t>
+            </a:r>
+            <a:endParaRPr lang="en-US" dirty="0"/>
+          </a:p>
+        </p:txBody>
+      </p:sp>
+      <p:sp>
+        <p:nvSpPr>
+          <p:cNvPr id="19" name="Rectangle 18"/>
+          <p:cNvSpPr/>
+          <p:nvPr/>
+        </p:nvSpPr>
+        <p:spPr>
+          <a:xfrm>
+            <a:off x="3987210" y="2714576"/>
+            <a:ext cx="1339702" cy="531628"/>
+          </a:xfrm>
+          <a:prstGeom prst="rect">
+            <a:avLst/>
+          </a:prstGeom>
+          <a:solidFill>
+            <a:srgbClr val="00B050"/>
+          </a:solidFill>
+          <a:ln>
+            <a:solidFill>
+              <a:schemeClr val="bg1"/>
+            </a:solidFill>
+          </a:ln>
+        </p:spPr>
+        <p:style>
+          <a:lnRef idx="2">
+            <a:schemeClr val="accent1">
+              <a:shade val="50000"/>
+            </a:schemeClr>
+          </a:lnRef>
+          <a:fillRef idx="1">
+            <a:schemeClr val="accent1"/>
+          </a:fillRef>
+          <a:effectRef idx="0">
+            <a:schemeClr val="accent1"/>
+          </a:effectRef>
+          <a:fontRef idx="minor">
+            <a:schemeClr val="lt1"/>
+          </a:fontRef>
+        </p:style>
+        <p:txBody>
+          <a:bodyPr rtlCol="0" anchor="ctr"/>
+          <a:lstStyle/>
+          <a:p>
+            <a:pPr algn="ctr"/>
+            <a:r>
+              <a:rPr lang="en-US" dirty="0" smtClean="0"/>
+              <a:t>Descriptor</a:t>
+            </a:r>
+            <a:endParaRPr lang="en-US" dirty="0"/>
+          </a:p>
+        </p:txBody>
+      </p:sp>
+      <p:sp>
+        <p:nvSpPr>
+          <p:cNvPr id="20" name="Rectangle 19"/>
+          <p:cNvSpPr/>
+          <p:nvPr/>
+        </p:nvSpPr>
+        <p:spPr>
+          <a:xfrm>
+            <a:off x="3987210" y="3242929"/>
+            <a:ext cx="1339702" cy="531628"/>
+          </a:xfrm>
+          <a:prstGeom prst="rect">
+            <a:avLst/>
+          </a:prstGeom>
+          <a:solidFill>
+            <a:srgbClr val="00B050"/>
+          </a:solidFill>
+          <a:ln>
+            <a:solidFill>
+              <a:schemeClr val="bg1"/>
+            </a:solidFill>
+          </a:ln>
+        </p:spPr>
+        <p:style>
+          <a:lnRef idx="2">
+            <a:schemeClr val="accent1">
+              <a:shade val="50000"/>
+            </a:schemeClr>
+          </a:lnRef>
+          <a:fillRef idx="1">
+            <a:schemeClr val="accent1"/>
+          </a:fillRef>
+          <a:effectRef idx="0">
+            <a:schemeClr val="accent1"/>
+          </a:effectRef>
+          <a:fontRef idx="minor">
+            <a:schemeClr val="lt1"/>
+          </a:fontRef>
+        </p:style>
+        <p:txBody>
+          <a:bodyPr rtlCol="0" anchor="ctr"/>
+          <a:lstStyle/>
+          <a:p>
+            <a:pPr algn="ctr"/>
+            <a:r>
+              <a:rPr lang="en-US" dirty="0" smtClean="0"/>
+              <a:t>Descriptor</a:t>
+            </a:r>
+            <a:endParaRPr lang="en-US" dirty="0"/>
+          </a:p>
+        </p:txBody>
+      </p:sp>
+      <p:sp>
+        <p:nvSpPr>
+          <p:cNvPr id="21" name="Rectangle 20"/>
+          <p:cNvSpPr/>
+          <p:nvPr/>
+        </p:nvSpPr>
+        <p:spPr>
+          <a:xfrm>
+            <a:off x="3987210" y="3771282"/>
+            <a:ext cx="1339702" cy="531628"/>
+          </a:xfrm>
+          <a:prstGeom prst="rect">
+            <a:avLst/>
+          </a:prstGeom>
+          <a:solidFill>
+            <a:srgbClr val="00B050"/>
+          </a:solidFill>
+          <a:ln>
+            <a:solidFill>
+              <a:schemeClr val="bg1"/>
+            </a:solidFill>
+          </a:ln>
+        </p:spPr>
+        <p:style>
+          <a:lnRef idx="2">
+            <a:schemeClr val="accent1">
+              <a:shade val="50000"/>
+            </a:schemeClr>
+          </a:lnRef>
+          <a:fillRef idx="1">
+            <a:schemeClr val="accent1"/>
+          </a:fillRef>
+          <a:effectRef idx="0">
+            <a:schemeClr val="accent1"/>
+          </a:effectRef>
+          <a:fontRef idx="minor">
+            <a:schemeClr val="lt1"/>
+          </a:fontRef>
+        </p:style>
+        <p:txBody>
+          <a:bodyPr rtlCol="0" anchor="ctr"/>
+          <a:lstStyle/>
+          <a:p>
+            <a:pPr algn="ctr"/>
+            <a:r>
+              <a:rPr lang="en-US" dirty="0" smtClean="0"/>
+              <a:t>Descriptor</a:t>
+            </a:r>
+            <a:endParaRPr lang="en-US" dirty="0"/>
+          </a:p>
+        </p:txBody>
+      </p:sp>
+      <p:sp>
+        <p:nvSpPr>
+          <p:cNvPr id="22" name="Rectangle 21"/>
+          <p:cNvSpPr/>
+          <p:nvPr/>
+        </p:nvSpPr>
+        <p:spPr>
+          <a:xfrm>
+            <a:off x="3987210" y="5356341"/>
+            <a:ext cx="1339702" cy="531628"/>
+          </a:xfrm>
+          <a:prstGeom prst="rect">
+            <a:avLst/>
+          </a:prstGeom>
+          <a:solidFill>
+            <a:srgbClr val="00B050"/>
+          </a:solidFill>
+          <a:ln>
+            <a:solidFill>
+              <a:schemeClr val="bg1"/>
+            </a:solidFill>
+          </a:ln>
+        </p:spPr>
+        <p:style>
+          <a:lnRef idx="2">
+            <a:schemeClr val="accent1">
+              <a:shade val="50000"/>
+            </a:schemeClr>
+          </a:lnRef>
+          <a:fillRef idx="1">
+            <a:schemeClr val="accent1"/>
+          </a:fillRef>
+          <a:effectRef idx="0">
+            <a:schemeClr val="accent1"/>
+          </a:effectRef>
+          <a:fontRef idx="minor">
+            <a:schemeClr val="lt1"/>
+          </a:fontRef>
+        </p:style>
+        <p:txBody>
+          <a:bodyPr rtlCol="0" anchor="ctr"/>
+          <a:lstStyle/>
+          <a:p>
+            <a:pPr algn="ctr"/>
+            <a:r>
+              <a:rPr lang="en-US" dirty="0" smtClean="0"/>
+              <a:t>Descriptor</a:t>
+            </a:r>
+            <a:endParaRPr lang="en-US" dirty="0"/>
+          </a:p>
+        </p:txBody>
+      </p:sp>
+      <p:sp>
+        <p:nvSpPr>
+          <p:cNvPr id="23" name="Rectangle 22"/>
+          <p:cNvSpPr/>
+          <p:nvPr/>
+        </p:nvSpPr>
+        <p:spPr>
+          <a:xfrm>
+            <a:off x="3987210" y="4299635"/>
+            <a:ext cx="1339702" cy="531628"/>
+          </a:xfrm>
+          <a:prstGeom prst="rect">
+            <a:avLst/>
+          </a:prstGeom>
+          <a:solidFill>
+            <a:srgbClr val="00B050"/>
+          </a:solidFill>
+          <a:ln>
+            <a:solidFill>
+              <a:schemeClr val="bg1"/>
+            </a:solidFill>
+          </a:ln>
+        </p:spPr>
+        <p:style>
+          <a:lnRef idx="2">
+            <a:schemeClr val="accent1">
+              <a:shade val="50000"/>
+            </a:schemeClr>
+          </a:lnRef>
+          <a:fillRef idx="1">
+            <a:schemeClr val="accent1"/>
+          </a:fillRef>
+          <a:effectRef idx="0">
+            <a:schemeClr val="accent1"/>
+          </a:effectRef>
+          <a:fontRef idx="minor">
+            <a:schemeClr val="lt1"/>
+          </a:fontRef>
+        </p:style>
+        <p:txBody>
+          <a:bodyPr rtlCol="0" anchor="ctr"/>
+          <a:lstStyle/>
+          <a:p>
+            <a:pPr algn="ctr"/>
+            <a:r>
+              <a:rPr lang="en-US" dirty="0" smtClean="0"/>
+              <a:t>Descriptor</a:t>
+            </a:r>
+            <a:endParaRPr lang="en-US" dirty="0"/>
+          </a:p>
+        </p:txBody>
+      </p:sp>
+      <p:sp>
+        <p:nvSpPr>
+          <p:cNvPr id="24" name="Rectangle 23"/>
+          <p:cNvSpPr/>
+          <p:nvPr/>
+        </p:nvSpPr>
+        <p:spPr>
+          <a:xfrm>
+            <a:off x="3987210" y="4832972"/>
+            <a:ext cx="1339702" cy="531628"/>
+          </a:xfrm>
+          <a:prstGeom prst="rect">
+            <a:avLst/>
+          </a:prstGeom>
+          <a:solidFill>
+            <a:srgbClr val="00B050"/>
+          </a:solidFill>
+          <a:ln>
+            <a:solidFill>
+              <a:schemeClr val="bg1"/>
+            </a:solidFill>
+          </a:ln>
+        </p:spPr>
+        <p:style>
+          <a:lnRef idx="2">
+            <a:schemeClr val="accent1">
+              <a:shade val="50000"/>
+            </a:schemeClr>
+          </a:lnRef>
+          <a:fillRef idx="1">
+            <a:schemeClr val="accent1"/>
+          </a:fillRef>
+          <a:effectRef idx="0">
+            <a:schemeClr val="accent1"/>
+          </a:effectRef>
+          <a:fontRef idx="minor">
+            <a:schemeClr val="lt1"/>
+          </a:fontRef>
+        </p:style>
+        <p:txBody>
+          <a:bodyPr rtlCol="0" anchor="ctr"/>
+          <a:lstStyle/>
+          <a:p>
+            <a:pPr algn="ctr"/>
+            <a:r>
+              <a:rPr lang="en-US" dirty="0" smtClean="0"/>
+              <a:t>Descriptor</a:t>
+            </a:r>
+            <a:endParaRPr lang="en-US" dirty="0"/>
+          </a:p>
+        </p:txBody>
+      </p:sp>
+      <p:cxnSp>
+        <p:nvCxnSpPr>
+          <p:cNvPr id="26" name="Straight Arrow Connector 25"/>
+          <p:cNvCxnSpPr>
+            <a:stCxn id="7" idx="3"/>
+            <a:endCxn id="8" idx="1"/>
+          </p:cNvCxnSpPr>
+          <p:nvPr/>
+        </p:nvCxnSpPr>
+        <p:spPr>
+          <a:xfrm flipV="1">
+            <a:off x="5326912" y="1900759"/>
+            <a:ext cx="1344833" cy="13100"/>
+          </a:xfrm>
+          <a:prstGeom prst="straightConnector1">
+            <a:avLst/>
+          </a:prstGeom>
+          <a:ln>
+            <a:solidFill>
+              <a:schemeClr val="tx1"/>
+            </a:solidFill>
+            <a:tailEnd type="triangle"/>
+          </a:ln>
+        </p:spPr>
+        <p:style>
+          <a:lnRef idx="1">
+            <a:schemeClr val="accent1"/>
+          </a:lnRef>
+          <a:fillRef idx="0">
+            <a:schemeClr val="accent1"/>
+          </a:fillRef>
+          <a:effectRef idx="0">
+            <a:schemeClr val="accent1"/>
+          </a:effectRef>
+          <a:fontRef idx="minor">
+            <a:schemeClr val="tx1"/>
+          </a:fontRef>
+        </p:style>
+      </p:cxnSp>
+      <p:cxnSp>
+        <p:nvCxnSpPr>
+          <p:cNvPr id="28" name="Straight Arrow Connector 27"/>
+          <p:cNvCxnSpPr/>
+          <p:nvPr/>
+        </p:nvCxnSpPr>
+        <p:spPr>
+          <a:xfrm flipV="1">
+            <a:off x="5326911" y="2456422"/>
+            <a:ext cx="1344833" cy="13100"/>
+          </a:xfrm>
+          <a:prstGeom prst="straightConnector1">
+            <a:avLst/>
+          </a:prstGeom>
+          <a:ln>
+            <a:solidFill>
+              <a:schemeClr val="tx1"/>
+            </a:solidFill>
+            <a:tailEnd type="triangle"/>
+          </a:ln>
+        </p:spPr>
+        <p:style>
+          <a:lnRef idx="1">
+            <a:schemeClr val="accent1"/>
+          </a:lnRef>
+          <a:fillRef idx="0">
+            <a:schemeClr val="accent1"/>
+          </a:fillRef>
+          <a:effectRef idx="0">
+            <a:schemeClr val="accent1"/>
+          </a:effectRef>
+          <a:fontRef idx="minor">
+            <a:schemeClr val="tx1"/>
+          </a:fontRef>
+        </p:style>
+      </p:cxnSp>
+      <p:cxnSp>
+        <p:nvCxnSpPr>
+          <p:cNvPr id="29" name="Straight Arrow Connector 28"/>
+          <p:cNvCxnSpPr/>
+          <p:nvPr/>
+        </p:nvCxnSpPr>
+        <p:spPr>
+          <a:xfrm flipV="1">
+            <a:off x="5326910" y="2988199"/>
+            <a:ext cx="1344833" cy="13100"/>
+          </a:xfrm>
+          <a:prstGeom prst="straightConnector1">
+            <a:avLst/>
+          </a:prstGeom>
+          <a:ln>
+            <a:solidFill>
+              <a:schemeClr val="tx1"/>
+            </a:solidFill>
+            <a:tailEnd type="triangle"/>
+          </a:ln>
+        </p:spPr>
+        <p:style>
+          <a:lnRef idx="1">
+            <a:schemeClr val="accent1"/>
+          </a:lnRef>
+          <a:fillRef idx="0">
+            <a:schemeClr val="accent1"/>
+          </a:fillRef>
+          <a:effectRef idx="0">
+            <a:schemeClr val="accent1"/>
+          </a:effectRef>
+          <a:fontRef idx="minor">
+            <a:schemeClr val="tx1"/>
+          </a:fontRef>
+        </p:style>
+      </p:cxnSp>
+      <p:cxnSp>
+        <p:nvCxnSpPr>
+          <p:cNvPr id="30" name="Straight Arrow Connector 29"/>
+          <p:cNvCxnSpPr/>
+          <p:nvPr/>
+        </p:nvCxnSpPr>
+        <p:spPr>
+          <a:xfrm flipV="1">
+            <a:off x="5326909" y="3489093"/>
+            <a:ext cx="1344833" cy="13100"/>
+          </a:xfrm>
+          <a:prstGeom prst="straightConnector1">
+            <a:avLst/>
+          </a:prstGeom>
+          <a:ln>
+            <a:solidFill>
+              <a:schemeClr val="tx1"/>
+            </a:solidFill>
+            <a:tailEnd type="triangle"/>
+          </a:ln>
+        </p:spPr>
+        <p:style>
+          <a:lnRef idx="1">
+            <a:schemeClr val="accent1"/>
+          </a:lnRef>
+          <a:fillRef idx="0">
+            <a:schemeClr val="accent1"/>
+          </a:fillRef>
+          <a:effectRef idx="0">
+            <a:schemeClr val="accent1"/>
+          </a:effectRef>
+          <a:fontRef idx="minor">
+            <a:schemeClr val="tx1"/>
+          </a:fontRef>
+        </p:style>
+      </p:cxnSp>
+      <p:cxnSp>
+        <p:nvCxnSpPr>
+          <p:cNvPr id="31" name="Straight Arrow Connector 30"/>
+          <p:cNvCxnSpPr/>
+          <p:nvPr/>
+        </p:nvCxnSpPr>
+        <p:spPr>
+          <a:xfrm flipV="1">
+            <a:off x="5326908" y="4051455"/>
+            <a:ext cx="1344833" cy="13100"/>
+          </a:xfrm>
+          <a:prstGeom prst="straightConnector1">
+            <a:avLst/>
+          </a:prstGeom>
+          <a:ln>
+            <a:solidFill>
+              <a:schemeClr val="tx1"/>
+            </a:solidFill>
+            <a:tailEnd type="triangle"/>
+          </a:ln>
+        </p:spPr>
+        <p:style>
+          <a:lnRef idx="1">
+            <a:schemeClr val="accent1"/>
+          </a:lnRef>
+          <a:fillRef idx="0">
+            <a:schemeClr val="accent1"/>
+          </a:fillRef>
+          <a:effectRef idx="0">
+            <a:schemeClr val="accent1"/>
+          </a:effectRef>
+          <a:fontRef idx="minor">
+            <a:schemeClr val="tx1"/>
+          </a:fontRef>
+        </p:style>
+      </p:cxnSp>
+      <p:cxnSp>
+        <p:nvCxnSpPr>
+          <p:cNvPr id="32" name="Straight Arrow Connector 31"/>
+          <p:cNvCxnSpPr/>
+          <p:nvPr/>
+        </p:nvCxnSpPr>
+        <p:spPr>
+          <a:xfrm flipV="1">
+            <a:off x="5326908" y="4593567"/>
+            <a:ext cx="1344833" cy="13100"/>
+          </a:xfrm>
+          <a:prstGeom prst="straightConnector1">
+            <a:avLst/>
+          </a:prstGeom>
+          <a:ln>
+            <a:solidFill>
+              <a:schemeClr val="tx1"/>
+            </a:solidFill>
+            <a:tailEnd type="triangle"/>
+          </a:ln>
+        </p:spPr>
+        <p:style>
+          <a:lnRef idx="1">
+            <a:schemeClr val="accent1"/>
+          </a:lnRef>
+          <a:fillRef idx="0">
+            <a:schemeClr val="accent1"/>
+          </a:fillRef>
+          <a:effectRef idx="0">
+            <a:schemeClr val="accent1"/>
+          </a:effectRef>
+          <a:fontRef idx="minor">
+            <a:schemeClr val="tx1"/>
+          </a:fontRef>
+        </p:style>
+      </p:cxnSp>
+      <p:cxnSp>
+        <p:nvCxnSpPr>
+          <p:cNvPr id="33" name="Straight Arrow Connector 32"/>
+          <p:cNvCxnSpPr/>
+          <p:nvPr/>
+        </p:nvCxnSpPr>
+        <p:spPr>
+          <a:xfrm flipV="1">
+            <a:off x="5326906" y="5081865"/>
+            <a:ext cx="1344833" cy="13100"/>
+          </a:xfrm>
+          <a:prstGeom prst="straightConnector1">
+            <a:avLst/>
+          </a:prstGeom>
+          <a:ln>
+            <a:solidFill>
+              <a:schemeClr val="tx1"/>
+            </a:solidFill>
+            <a:tailEnd type="triangle"/>
+          </a:ln>
+        </p:spPr>
+        <p:style>
+          <a:lnRef idx="1">
+            <a:schemeClr val="accent1"/>
+          </a:lnRef>
+          <a:fillRef idx="0">
+            <a:schemeClr val="accent1"/>
+          </a:fillRef>
+          <a:effectRef idx="0">
+            <a:schemeClr val="accent1"/>
+          </a:effectRef>
+          <a:fontRef idx="minor">
+            <a:schemeClr val="tx1"/>
+          </a:fontRef>
+        </p:style>
+      </p:cxnSp>
+      <p:cxnSp>
+        <p:nvCxnSpPr>
+          <p:cNvPr id="34" name="Straight Arrow Connector 33"/>
+          <p:cNvCxnSpPr/>
+          <p:nvPr/>
+        </p:nvCxnSpPr>
+        <p:spPr>
+          <a:xfrm flipV="1">
+            <a:off x="5326906" y="5603161"/>
+            <a:ext cx="1344833" cy="13100"/>
+          </a:xfrm>
+          <a:prstGeom prst="straightConnector1">
+            <a:avLst/>
+          </a:prstGeom>
+          <a:ln>
+            <a:solidFill>
+              <a:schemeClr val="tx1"/>
+            </a:solidFill>
+            <a:tailEnd type="triangle"/>
+          </a:ln>
+        </p:spPr>
+        <p:style>
+          <a:lnRef idx="1">
+            <a:schemeClr val="accent1"/>
+          </a:lnRef>
+          <a:fillRef idx="0">
+            <a:schemeClr val="accent1"/>
+          </a:fillRef>
+          <a:effectRef idx="0">
+            <a:schemeClr val="accent1"/>
+          </a:effectRef>
+          <a:fontRef idx="minor">
+            <a:schemeClr val="tx1"/>
+          </a:fontRef>
+        </p:style>
+      </p:cxnSp>
+    </p:spTree>
+    <p:extLst>
+      <p:ext uri="{BB962C8B-B14F-4D97-AF65-F5344CB8AC3E}">
+        <p14:creationId xmlns:p14="http://schemas.microsoft.com/office/powerpoint/2010/main" val="43471237"/>
+      </p:ext>
+    </p:extLst>
+  </p:cSld>
+  <p:clrMapOvr>
+    <a:masterClrMapping/>
+  </p:clrMapOvr>
+  <p:timing>
+    <p:tnLst>
+      <p:par>
+        <p:cTn id="1" dur="indefinite" restart="never" nodeType="tmRoot">
+          <p:childTnLst>
+            <p:seq concurrent="1" nextAc="seek">
+              <p:cTn id="2" dur="indefinite" nodeType="mainSeq">
+                <p:childTnLst>
+                  <p:par>
+                    <p:cTn id="3" fill="hold">
+                      <p:stCondLst>
+                        <p:cond delay="indefinite"/>
+                      </p:stCondLst>
+                      <p:childTnLst>
+                        <p:par>
+                          <p:cTn id="4" fill="hold">
+                            <p:stCondLst>
+                              <p:cond delay="0"/>
+                            </p:stCondLst>
+                            <p:childTnLst>
+                              <p:par>
+                                <p:cTn id="5" presetID="1" presetClass="emph" presetSubtype="2" fill="hold" nodeType="clickEffect">
+                                  <p:stCondLst>
+                                    <p:cond delay="0"/>
+                                  </p:stCondLst>
+                                  <p:childTnLst>
+                                    <p:animClr clrSpc="rgb" dir="cw">
+                                      <p:cBhvr>
+                                        <p:cTn id="6" dur="1000" fill="hold"/>
+                                        <p:tgtEl>
+                                          <p:spTgt spid="8"/>
+                                        </p:tgtEl>
+                                        <p:attrNameLst>
+                                          <p:attrName>fillcolor</p:attrName>
+                                        </p:attrNameLst>
+                                      </p:cBhvr>
+                                      <p:to>
+                                        <a:schemeClr val="accent2"/>
+                                      </p:to>
+                                    </p:animClr>
+                                    <p:set>
+                                      <p:cBhvr>
+                                        <p:cTn id="7" dur="1000" fill="hold"/>
+                                        <p:tgtEl>
+                                          <p:spTgt spid="8"/>
+                                        </p:tgtEl>
+                                        <p:attrNameLst>
+                                          <p:attrName>fill.type</p:attrName>
+                                        </p:attrNameLst>
+                                      </p:cBhvr>
+                                      <p:to>
+                                        <p:strVal val="solid"/>
+                                      </p:to>
+                                    </p:set>
+                                    <p:set>
+                                      <p:cBhvr>
+                                        <p:cTn id="8" dur="1000" fill="hold"/>
+                                        <p:tgtEl>
+                                          <p:spTgt spid="8"/>
+                                        </p:tgtEl>
+                                        <p:attrNameLst>
+                                          <p:attrName>fill.on</p:attrName>
+                                        </p:attrNameLst>
+                                      </p:cBhvr>
+                                      <p:to>
+                                        <p:strVal val="true"/>
+                                      </p:to>
+                                    </p:set>
+                                  </p:childTnLst>
+                                </p:cTn>
+                              </p:par>
+                            </p:childTnLst>
+                          </p:cTn>
+                        </p:par>
+                      </p:childTnLst>
+                    </p:cTn>
+                  </p:par>
+                  <p:par>
+                    <p:cTn id="9" fill="hold">
+                      <p:stCondLst>
+                        <p:cond delay="indefinite"/>
+                      </p:stCondLst>
+                      <p:childTnLst>
+                        <p:par>
+                          <p:cTn id="10" fill="hold">
+                            <p:stCondLst>
+                              <p:cond delay="0"/>
+                            </p:stCondLst>
+                            <p:childTnLst>
+                              <p:par>
+                                <p:cTn id="11" presetID="1" presetClass="emph" presetSubtype="2" fill="hold" nodeType="clickEffect">
+                                  <p:stCondLst>
+                                    <p:cond delay="0"/>
+                                  </p:stCondLst>
+                                  <p:childTnLst>
+                                    <p:animClr clrSpc="rgb" dir="cw">
+                                      <p:cBhvr>
+                                        <p:cTn id="12" dur="1000" fill="hold"/>
+                                        <p:tgtEl>
+                                          <p:spTgt spid="7"/>
+                                        </p:tgtEl>
+                                        <p:attrNameLst>
+                                          <p:attrName>fillcolor</p:attrName>
+                                        </p:attrNameLst>
+                                      </p:cBhvr>
+                                      <p:to>
+                                        <a:schemeClr val="accent2"/>
+                                      </p:to>
+                                    </p:animClr>
+                                    <p:set>
+                                      <p:cBhvr>
+                                        <p:cTn id="13" dur="1000" fill="hold"/>
+                                        <p:tgtEl>
+                                          <p:spTgt spid="7"/>
+                                        </p:tgtEl>
+                                        <p:attrNameLst>
+                                          <p:attrName>fill.type</p:attrName>
+                                        </p:attrNameLst>
+                                      </p:cBhvr>
+                                      <p:to>
+                                        <p:strVal val="solid"/>
+                                      </p:to>
+                                    </p:set>
+                                    <p:set>
+                                      <p:cBhvr>
+                                        <p:cTn id="14" dur="1000" fill="hold"/>
+                                        <p:tgtEl>
+                                          <p:spTgt spid="7"/>
+                                        </p:tgtEl>
+                                        <p:attrNameLst>
+                                          <p:attrName>fill.on</p:attrName>
+                                        </p:attrNameLst>
+                                      </p:cBhvr>
+                                      <p:to>
+                                        <p:strVal val="true"/>
+                                      </p:to>
+                                    </p:set>
+                                  </p:childTnLst>
+                                </p:cTn>
+                              </p:par>
+                            </p:childTnLst>
+                          </p:cTn>
+                        </p:par>
+                      </p:childTnLst>
+                    </p:cTn>
+                  </p:par>
+                  <p:par>
+                    <p:cTn id="15" fill="hold">
+                      <p:stCondLst>
+                        <p:cond delay="indefinite"/>
+                      </p:stCondLst>
+                      <p:childTnLst>
+                        <p:par>
+                          <p:cTn id="16" fill="hold">
+                            <p:stCondLst>
+                              <p:cond delay="0"/>
+                            </p:stCondLst>
+                            <p:childTnLst>
+                              <p:par>
+                                <p:cTn id="17" presetID="1" presetClass="emph" presetSubtype="2" fill="hold" nodeType="clickEffect">
+                                  <p:stCondLst>
+                                    <p:cond delay="0"/>
+                                  </p:stCondLst>
+                                  <p:childTnLst>
+                                    <p:animClr clrSpc="rgb" dir="cw">
+                                      <p:cBhvr>
+                                        <p:cTn id="18" dur="1000" fill="hold"/>
+                                        <p:tgtEl>
+                                          <p:spTgt spid="9"/>
+                                        </p:tgtEl>
+                                        <p:attrNameLst>
+                                          <p:attrName>fillcolor</p:attrName>
+                                        </p:attrNameLst>
+                                      </p:cBhvr>
+                                      <p:to>
+                                        <a:schemeClr val="accent2"/>
+                                      </p:to>
+                                    </p:animClr>
+                                    <p:set>
+                                      <p:cBhvr>
+                                        <p:cTn id="19" dur="1000" fill="hold"/>
+                                        <p:tgtEl>
+                                          <p:spTgt spid="9"/>
+                                        </p:tgtEl>
+                                        <p:attrNameLst>
+                                          <p:attrName>fill.type</p:attrName>
+                                        </p:attrNameLst>
+                                      </p:cBhvr>
+                                      <p:to>
+                                        <p:strVal val="solid"/>
+                                      </p:to>
+                                    </p:set>
+                                    <p:set>
+                                      <p:cBhvr>
+                                        <p:cTn id="20" dur="1000" fill="hold"/>
+                                        <p:tgtEl>
+                                          <p:spTgt spid="9"/>
+                                        </p:tgtEl>
+                                        <p:attrNameLst>
+                                          <p:attrName>fill.on</p:attrName>
+                                        </p:attrNameLst>
+                                      </p:cBhvr>
+                                      <p:to>
+                                        <p:strVal val="true"/>
+                                      </p:to>
+                                    </p:set>
+                                  </p:childTnLst>
+                                </p:cTn>
+                              </p:par>
+                            </p:childTnLst>
+                          </p:cTn>
+                        </p:par>
+                      </p:childTnLst>
+                    </p:cTn>
+                  </p:par>
+                  <p:par>
+                    <p:cTn id="21" fill="hold">
+                      <p:stCondLst>
+                        <p:cond delay="indefinite"/>
+                      </p:stCondLst>
+                      <p:childTnLst>
+                        <p:par>
+                          <p:cTn id="22" fill="hold">
+                            <p:stCondLst>
+                              <p:cond delay="0"/>
+                            </p:stCondLst>
+                            <p:childTnLst>
+                              <p:par>
+                                <p:cTn id="23" presetID="1" presetClass="emph" presetSubtype="2" fill="hold" nodeType="clickEffect">
+                                  <p:stCondLst>
+                                    <p:cond delay="0"/>
+                                  </p:stCondLst>
+                                  <p:childTnLst>
+                                    <p:animClr clrSpc="rgb" dir="cw">
+                                      <p:cBhvr>
+                                        <p:cTn id="24" dur="1000" fill="hold"/>
+                                        <p:tgtEl>
+                                          <p:spTgt spid="18"/>
+                                        </p:tgtEl>
+                                        <p:attrNameLst>
+                                          <p:attrName>fillcolor</p:attrName>
+                                        </p:attrNameLst>
+                                      </p:cBhvr>
+                                      <p:to>
+                                        <a:schemeClr val="accent2"/>
+                                      </p:to>
+                                    </p:animClr>
+                                    <p:set>
+                                      <p:cBhvr>
+                                        <p:cTn id="25" dur="1000" fill="hold"/>
+                                        <p:tgtEl>
+                                          <p:spTgt spid="18"/>
+                                        </p:tgtEl>
+                                        <p:attrNameLst>
+                                          <p:attrName>fill.type</p:attrName>
+                                        </p:attrNameLst>
+                                      </p:cBhvr>
+                                      <p:to>
+                                        <p:strVal val="solid"/>
+                                      </p:to>
+                                    </p:set>
+                                    <p:set>
+                                      <p:cBhvr>
+                                        <p:cTn id="26" dur="1000" fill="hold"/>
+                                        <p:tgtEl>
+                                          <p:spTgt spid="18"/>
+                                        </p:tgtEl>
+                                        <p:attrNameLst>
+                                          <p:attrName>fill.on</p:attrName>
+                                        </p:attrNameLst>
+                                      </p:cBhvr>
+                                      <p:to>
+                                        <p:strVal val="true"/>
+                                      </p:to>
+                                    </p:set>
+                                  </p:childTnLst>
+                                </p:cTn>
+                              </p:par>
+                            </p:childTnLst>
+                          </p:cTn>
+                        </p:par>
+                      </p:childTnLst>
+                    </p:cTn>
+                  </p:par>
+                  <p:par>
+                    <p:cTn id="27" fill="hold">
+                      <p:stCondLst>
+                        <p:cond delay="indefinite"/>
+                      </p:stCondLst>
+                      <p:childTnLst>
+                        <p:par>
+                          <p:cTn id="28" fill="hold">
+                            <p:stCondLst>
+                              <p:cond delay="0"/>
+                            </p:stCondLst>
+                            <p:childTnLst>
+                              <p:par>
+                                <p:cTn id="29" presetID="1" presetClass="emph" presetSubtype="2" fill="hold" nodeType="clickEffect">
+                                  <p:stCondLst>
+                                    <p:cond delay="0"/>
+                                  </p:stCondLst>
+                                  <p:childTnLst>
+                                    <p:animClr clrSpc="rgb" dir="cw">
+                                      <p:cBhvr>
+                                        <p:cTn id="30" dur="1000" fill="hold"/>
+                                        <p:tgtEl>
+                                          <p:spTgt spid="10"/>
+                                        </p:tgtEl>
+                                        <p:attrNameLst>
+                                          <p:attrName>fillcolor</p:attrName>
+                                        </p:attrNameLst>
+                                      </p:cBhvr>
+                                      <p:to>
+                                        <a:schemeClr val="accent2"/>
+                                      </p:to>
+                                    </p:animClr>
+                                    <p:set>
+                                      <p:cBhvr>
+                                        <p:cTn id="31" dur="1000" fill="hold"/>
+                                        <p:tgtEl>
+                                          <p:spTgt spid="10"/>
+                                        </p:tgtEl>
+                                        <p:attrNameLst>
+                                          <p:attrName>fill.type</p:attrName>
+                                        </p:attrNameLst>
+                                      </p:cBhvr>
+                                      <p:to>
+                                        <p:strVal val="solid"/>
+                                      </p:to>
+                                    </p:set>
+                                    <p:set>
+                                      <p:cBhvr>
+                                        <p:cTn id="32" dur="1000" fill="hold"/>
+                                        <p:tgtEl>
+                                          <p:spTgt spid="10"/>
+                                        </p:tgtEl>
+                                        <p:attrNameLst>
+                                          <p:attrName>fill.on</p:attrName>
+                                        </p:attrNameLst>
+                                      </p:cBhvr>
+                                      <p:to>
+                                        <p:strVal val="true"/>
+                                      </p:to>
+                                    </p:set>
+                                  </p:childTnLst>
+                                </p:cTn>
+                              </p:par>
+                              <p:par>
+                                <p:cTn id="33" presetID="1" presetClass="emph" presetSubtype="2" fill="hold" nodeType="withEffect">
+                                  <p:stCondLst>
+                                    <p:cond delay="0"/>
+                                  </p:stCondLst>
+                                  <p:childTnLst>
+                                    <p:animClr clrSpc="rgb" dir="cw">
+                                      <p:cBhvr>
+                                        <p:cTn id="34" dur="1000" fill="hold"/>
+                                        <p:tgtEl>
+                                          <p:spTgt spid="16"/>
+                                        </p:tgtEl>
+                                        <p:attrNameLst>
+                                          <p:attrName>fillcolor</p:attrName>
+                                        </p:attrNameLst>
+                                      </p:cBhvr>
+                                      <p:to>
+                                        <a:schemeClr val="accent2"/>
+                                      </p:to>
+                                    </p:animClr>
+                                    <p:set>
+                                      <p:cBhvr>
+                                        <p:cTn id="35" dur="1000" fill="hold"/>
+                                        <p:tgtEl>
+                                          <p:spTgt spid="16"/>
+                                        </p:tgtEl>
+                                        <p:attrNameLst>
+                                          <p:attrName>fill.type</p:attrName>
+                                        </p:attrNameLst>
+                                      </p:cBhvr>
+                                      <p:to>
+                                        <p:strVal val="solid"/>
+                                      </p:to>
+                                    </p:set>
+                                    <p:set>
+                                      <p:cBhvr>
+                                        <p:cTn id="36" dur="1000" fill="hold"/>
+                                        <p:tgtEl>
+                                          <p:spTgt spid="16"/>
+                                        </p:tgtEl>
+                                        <p:attrNameLst>
+                                          <p:attrName>fill.on</p:attrName>
+                                        </p:attrNameLst>
+                                      </p:cBhvr>
+                                      <p:to>
+                                        <p:strVal val="true"/>
+                                      </p:to>
+                                    </p:set>
+                                  </p:childTnLst>
+                                </p:cTn>
+                              </p:par>
+                              <p:par>
+                                <p:cTn id="37" presetID="1" presetClass="emph" presetSubtype="2" fill="hold" nodeType="withEffect">
+                                  <p:stCondLst>
+                                    <p:cond delay="0"/>
+                                  </p:stCondLst>
+                                  <p:childTnLst>
+                                    <p:animClr clrSpc="rgb" dir="cw">
+                                      <p:cBhvr>
+                                        <p:cTn id="38" dur="1000" fill="hold"/>
+                                        <p:tgtEl>
+                                          <p:spTgt spid="11"/>
+                                        </p:tgtEl>
+                                        <p:attrNameLst>
+                                          <p:attrName>fillcolor</p:attrName>
+                                        </p:attrNameLst>
+                                      </p:cBhvr>
+                                      <p:to>
+                                        <a:schemeClr val="accent2"/>
+                                      </p:to>
+                                    </p:animClr>
+                                    <p:set>
+                                      <p:cBhvr>
+                                        <p:cTn id="39" dur="1000" fill="hold"/>
+                                        <p:tgtEl>
+                                          <p:spTgt spid="11"/>
+                                        </p:tgtEl>
+                                        <p:attrNameLst>
+                                          <p:attrName>fill.type</p:attrName>
+                                        </p:attrNameLst>
+                                      </p:cBhvr>
+                                      <p:to>
+                                        <p:strVal val="solid"/>
+                                      </p:to>
+                                    </p:set>
+                                    <p:set>
+                                      <p:cBhvr>
+                                        <p:cTn id="40" dur="1000" fill="hold"/>
+                                        <p:tgtEl>
+                                          <p:spTgt spid="11"/>
+                                        </p:tgtEl>
+                                        <p:attrNameLst>
+                                          <p:attrName>fill.on</p:attrName>
+                                        </p:attrNameLst>
+                                      </p:cBhvr>
+                                      <p:to>
+                                        <p:strVal val="true"/>
+                                      </p:to>
+                                    </p:set>
+                                  </p:childTnLst>
+                                </p:cTn>
+                              </p:par>
+                              <p:par>
+                                <p:cTn id="41" presetID="1" presetClass="emph" presetSubtype="2" fill="hold" nodeType="withEffect">
+                                  <p:stCondLst>
+                                    <p:cond delay="0"/>
+                                  </p:stCondLst>
+                                  <p:childTnLst>
+                                    <p:animClr clrSpc="rgb" dir="cw">
+                                      <p:cBhvr>
+                                        <p:cTn id="42" dur="1000" fill="hold"/>
+                                        <p:tgtEl>
+                                          <p:spTgt spid="13"/>
+                                        </p:tgtEl>
+                                        <p:attrNameLst>
+                                          <p:attrName>fillcolor</p:attrName>
+                                        </p:attrNameLst>
+                                      </p:cBhvr>
+                                      <p:to>
+                                        <a:schemeClr val="accent2"/>
+                                      </p:to>
+                                    </p:animClr>
+                                    <p:set>
+                                      <p:cBhvr>
+                                        <p:cTn id="43" dur="1000" fill="hold"/>
+                                        <p:tgtEl>
+                                          <p:spTgt spid="13"/>
+                                        </p:tgtEl>
+                                        <p:attrNameLst>
+                                          <p:attrName>fill.type</p:attrName>
+                                        </p:attrNameLst>
+                                      </p:cBhvr>
+                                      <p:to>
+                                        <p:strVal val="solid"/>
+                                      </p:to>
+                                    </p:set>
+                                    <p:set>
+                                      <p:cBhvr>
+                                        <p:cTn id="44" dur="1000" fill="hold"/>
+                                        <p:tgtEl>
+                                          <p:spTgt spid="13"/>
+                                        </p:tgtEl>
+                                        <p:attrNameLst>
+                                          <p:attrName>fill.on</p:attrName>
+                                        </p:attrNameLst>
+                                      </p:cBhvr>
+                                      <p:to>
+                                        <p:strVal val="true"/>
+                                      </p:to>
+                                    </p:set>
+                                  </p:childTnLst>
+                                </p:cTn>
+                              </p:par>
+                              <p:par>
+                                <p:cTn id="45" presetID="1" presetClass="emph" presetSubtype="2" fill="hold" nodeType="withEffect">
+                                  <p:stCondLst>
+                                    <p:cond delay="0"/>
+                                  </p:stCondLst>
+                                  <p:childTnLst>
+                                    <p:animClr clrSpc="rgb" dir="cw">
+                                      <p:cBhvr>
+                                        <p:cTn id="46" dur="1000" fill="hold"/>
+                                        <p:tgtEl>
+                                          <p:spTgt spid="14"/>
+                                        </p:tgtEl>
+                                        <p:attrNameLst>
+                                          <p:attrName>fillcolor</p:attrName>
+                                        </p:attrNameLst>
+                                      </p:cBhvr>
+                                      <p:to>
+                                        <a:schemeClr val="accent2"/>
+                                      </p:to>
+                                    </p:animClr>
+                                    <p:set>
+                                      <p:cBhvr>
+                                        <p:cTn id="47" dur="1000" fill="hold"/>
+                                        <p:tgtEl>
+                                          <p:spTgt spid="14"/>
+                                        </p:tgtEl>
+                                        <p:attrNameLst>
+                                          <p:attrName>fill.type</p:attrName>
+                                        </p:attrNameLst>
+                                      </p:cBhvr>
+                                      <p:to>
+                                        <p:strVal val="solid"/>
+                                      </p:to>
+                                    </p:set>
+                                    <p:set>
+                                      <p:cBhvr>
+                                        <p:cTn id="48" dur="1000" fill="hold"/>
+                                        <p:tgtEl>
+                                          <p:spTgt spid="14"/>
+                                        </p:tgtEl>
+                                        <p:attrNameLst>
+                                          <p:attrName>fill.on</p:attrName>
+                                        </p:attrNameLst>
+                                      </p:cBhvr>
+                                      <p:to>
+                                        <p:strVal val="true"/>
+                                      </p:to>
+                                    </p:set>
+                                  </p:childTnLst>
+                                </p:cTn>
+                              </p:par>
+                              <p:par>
+                                <p:cTn id="49" presetID="1" presetClass="emph" presetSubtype="2" fill="hold" nodeType="withEffect">
+                                  <p:stCondLst>
+                                    <p:cond delay="0"/>
+                                  </p:stCondLst>
+                                  <p:childTnLst>
+                                    <p:animClr clrSpc="rgb" dir="cw">
+                                      <p:cBhvr>
+                                        <p:cTn id="50" dur="1000" fill="hold"/>
+                                        <p:tgtEl>
+                                          <p:spTgt spid="15"/>
+                                        </p:tgtEl>
+                                        <p:attrNameLst>
+                                          <p:attrName>fillcolor</p:attrName>
+                                        </p:attrNameLst>
+                                      </p:cBhvr>
+                                      <p:to>
+                                        <a:schemeClr val="accent2"/>
+                                      </p:to>
+                                    </p:animClr>
+                                    <p:set>
+                                      <p:cBhvr>
+                                        <p:cTn id="51" dur="1000" fill="hold"/>
+                                        <p:tgtEl>
+                                          <p:spTgt spid="15"/>
+                                        </p:tgtEl>
+                                        <p:attrNameLst>
+                                          <p:attrName>fill.type</p:attrName>
+                                        </p:attrNameLst>
+                                      </p:cBhvr>
+                                      <p:to>
+                                        <p:strVal val="solid"/>
+                                      </p:to>
+                                    </p:set>
+                                    <p:set>
+                                      <p:cBhvr>
+                                        <p:cTn id="52" dur="1000" fill="hold"/>
+                                        <p:tgtEl>
+                                          <p:spTgt spid="15"/>
+                                        </p:tgtEl>
+                                        <p:attrNameLst>
+                                          <p:attrName>fill.on</p:attrName>
+                                        </p:attrNameLst>
+                                      </p:cBhvr>
+                                      <p:to>
+                                        <p:strVal val="true"/>
+                                      </p:to>
+                                    </p:set>
+                                  </p:childTnLst>
+                                </p:cTn>
+                              </p:par>
+                            </p:childTnLst>
+                          </p:cTn>
+                        </p:par>
+                      </p:childTnLst>
+                    </p:cTn>
+                  </p:par>
+                  <p:par>
+                    <p:cTn id="53" fill="hold">
+                      <p:stCondLst>
+                        <p:cond delay="indefinite"/>
+                      </p:stCondLst>
+                      <p:childTnLst>
+                        <p:par>
+                          <p:cTn id="54" fill="hold">
+                            <p:stCondLst>
+                              <p:cond delay="0"/>
+                            </p:stCondLst>
+                            <p:childTnLst>
+                              <p:par>
+                                <p:cTn id="55" presetID="1" presetClass="emph" presetSubtype="2" fill="hold" nodeType="clickEffect">
+                                  <p:stCondLst>
+                                    <p:cond delay="0"/>
+                                  </p:stCondLst>
+                                  <p:childTnLst>
+                                    <p:animClr clrSpc="rgb" dir="cw">
+                                      <p:cBhvr>
+                                        <p:cTn id="56" dur="1000" fill="hold"/>
+                                        <p:tgtEl>
+                                          <p:spTgt spid="19"/>
+                                        </p:tgtEl>
+                                        <p:attrNameLst>
+                                          <p:attrName>fillcolor</p:attrName>
+                                        </p:attrNameLst>
+                                      </p:cBhvr>
+                                      <p:to>
+                                        <a:schemeClr val="accent2"/>
+                                      </p:to>
+                                    </p:animClr>
+                                    <p:set>
+                                      <p:cBhvr>
+                                        <p:cTn id="57" dur="1000" fill="hold"/>
+                                        <p:tgtEl>
+                                          <p:spTgt spid="19"/>
+                                        </p:tgtEl>
+                                        <p:attrNameLst>
+                                          <p:attrName>fill.type</p:attrName>
+                                        </p:attrNameLst>
+                                      </p:cBhvr>
+                                      <p:to>
+                                        <p:strVal val="solid"/>
+                                      </p:to>
+                                    </p:set>
+                                    <p:set>
+                                      <p:cBhvr>
+                                        <p:cTn id="58" dur="1000" fill="hold"/>
+                                        <p:tgtEl>
+                                          <p:spTgt spid="19"/>
+                                        </p:tgtEl>
+                                        <p:attrNameLst>
+                                          <p:attrName>fill.on</p:attrName>
+                                        </p:attrNameLst>
+                                      </p:cBhvr>
+                                      <p:to>
+                                        <p:strVal val="true"/>
+                                      </p:to>
+                                    </p:set>
+                                  </p:childTnLst>
+                                </p:cTn>
+                              </p:par>
+                              <p:par>
+                                <p:cTn id="59" presetID="1" presetClass="emph" presetSubtype="2" fill="hold" nodeType="withEffect">
+                                  <p:stCondLst>
+                                    <p:cond delay="0"/>
+                                  </p:stCondLst>
+                                  <p:childTnLst>
+                                    <p:animClr clrSpc="rgb" dir="cw">
+                                      <p:cBhvr>
+                                        <p:cTn id="60" dur="1000" fill="hold"/>
+                                        <p:tgtEl>
+                                          <p:spTgt spid="20"/>
+                                        </p:tgtEl>
+                                        <p:attrNameLst>
+                                          <p:attrName>fillcolor</p:attrName>
+                                        </p:attrNameLst>
+                                      </p:cBhvr>
+                                      <p:to>
+                                        <a:schemeClr val="accent2"/>
+                                      </p:to>
+                                    </p:animClr>
+                                    <p:set>
+                                      <p:cBhvr>
+                                        <p:cTn id="61" dur="1000" fill="hold"/>
+                                        <p:tgtEl>
+                                          <p:spTgt spid="20"/>
+                                        </p:tgtEl>
+                                        <p:attrNameLst>
+                                          <p:attrName>fill.type</p:attrName>
+                                        </p:attrNameLst>
+                                      </p:cBhvr>
+                                      <p:to>
+                                        <p:strVal val="solid"/>
+                                      </p:to>
+                                    </p:set>
+                                    <p:set>
+                                      <p:cBhvr>
+                                        <p:cTn id="62" dur="1000" fill="hold"/>
+                                        <p:tgtEl>
+                                          <p:spTgt spid="20"/>
+                                        </p:tgtEl>
+                                        <p:attrNameLst>
+                                          <p:attrName>fill.on</p:attrName>
+                                        </p:attrNameLst>
+                                      </p:cBhvr>
+                                      <p:to>
+                                        <p:strVal val="true"/>
+                                      </p:to>
+                                    </p:set>
+                                  </p:childTnLst>
+                                </p:cTn>
+                              </p:par>
+                              <p:par>
+                                <p:cTn id="63" presetID="1" presetClass="emph" presetSubtype="2" fill="hold" nodeType="withEffect">
+                                  <p:stCondLst>
+                                    <p:cond delay="0"/>
+                                  </p:stCondLst>
+                                  <p:childTnLst>
+                                    <p:animClr clrSpc="rgb" dir="cw">
+                                      <p:cBhvr>
+                                        <p:cTn id="64" dur="1000" fill="hold"/>
+                                        <p:tgtEl>
+                                          <p:spTgt spid="21"/>
+                                        </p:tgtEl>
+                                        <p:attrNameLst>
+                                          <p:attrName>fillcolor</p:attrName>
+                                        </p:attrNameLst>
+                                      </p:cBhvr>
+                                      <p:to>
+                                        <a:schemeClr val="accent2"/>
+                                      </p:to>
+                                    </p:animClr>
+                                    <p:set>
+                                      <p:cBhvr>
+                                        <p:cTn id="65" dur="1000" fill="hold"/>
+                                        <p:tgtEl>
+                                          <p:spTgt spid="21"/>
+                                        </p:tgtEl>
+                                        <p:attrNameLst>
+                                          <p:attrName>fill.type</p:attrName>
+                                        </p:attrNameLst>
+                                      </p:cBhvr>
+                                      <p:to>
+                                        <p:strVal val="solid"/>
+                                      </p:to>
+                                    </p:set>
+                                    <p:set>
+                                      <p:cBhvr>
+                                        <p:cTn id="66" dur="1000" fill="hold"/>
+                                        <p:tgtEl>
+                                          <p:spTgt spid="21"/>
+                                        </p:tgtEl>
+                                        <p:attrNameLst>
+                                          <p:attrName>fill.on</p:attrName>
+                                        </p:attrNameLst>
+                                      </p:cBhvr>
+                                      <p:to>
+                                        <p:strVal val="true"/>
+                                      </p:to>
+                                    </p:set>
+                                  </p:childTnLst>
+                                </p:cTn>
+                              </p:par>
+                              <p:par>
+                                <p:cTn id="67" presetID="1" presetClass="emph" presetSubtype="2" fill="hold" nodeType="withEffect">
+                                  <p:stCondLst>
+                                    <p:cond delay="0"/>
+                                  </p:stCondLst>
+                                  <p:childTnLst>
+                                    <p:animClr clrSpc="rgb" dir="cw">
+                                      <p:cBhvr>
+                                        <p:cTn id="68" dur="1000" fill="hold"/>
+                                        <p:tgtEl>
+                                          <p:spTgt spid="23"/>
+                                        </p:tgtEl>
+                                        <p:attrNameLst>
+                                          <p:attrName>fillcolor</p:attrName>
+                                        </p:attrNameLst>
+                                      </p:cBhvr>
+                                      <p:to>
+                                        <a:schemeClr val="accent2"/>
+                                      </p:to>
+                                    </p:animClr>
+                                    <p:set>
+                                      <p:cBhvr>
+                                        <p:cTn id="69" dur="1000" fill="hold"/>
+                                        <p:tgtEl>
+                                          <p:spTgt spid="23"/>
+                                        </p:tgtEl>
+                                        <p:attrNameLst>
+                                          <p:attrName>fill.type</p:attrName>
+                                        </p:attrNameLst>
+                                      </p:cBhvr>
+                                      <p:to>
+                                        <p:strVal val="solid"/>
+                                      </p:to>
+                                    </p:set>
+                                    <p:set>
+                                      <p:cBhvr>
+                                        <p:cTn id="70" dur="1000" fill="hold"/>
+                                        <p:tgtEl>
+                                          <p:spTgt spid="23"/>
+                                        </p:tgtEl>
+                                        <p:attrNameLst>
+                                          <p:attrName>fill.on</p:attrName>
+                                        </p:attrNameLst>
+                                      </p:cBhvr>
+                                      <p:to>
+                                        <p:strVal val="true"/>
+                                      </p:to>
+                                    </p:set>
+                                  </p:childTnLst>
+                                </p:cTn>
+                              </p:par>
+                              <p:par>
+                                <p:cTn id="71" presetID="1" presetClass="emph" presetSubtype="2" fill="hold" nodeType="withEffect">
+                                  <p:stCondLst>
+                                    <p:cond delay="0"/>
+                                  </p:stCondLst>
+                                  <p:childTnLst>
+                                    <p:animClr clrSpc="rgb" dir="cw">
+                                      <p:cBhvr>
+                                        <p:cTn id="72" dur="1000" fill="hold"/>
+                                        <p:tgtEl>
+                                          <p:spTgt spid="24"/>
+                                        </p:tgtEl>
+                                        <p:attrNameLst>
+                                          <p:attrName>fillcolor</p:attrName>
+                                        </p:attrNameLst>
+                                      </p:cBhvr>
+                                      <p:to>
+                                        <a:schemeClr val="accent2"/>
+                                      </p:to>
+                                    </p:animClr>
+                                    <p:set>
+                                      <p:cBhvr>
+                                        <p:cTn id="73" dur="1000" fill="hold"/>
+                                        <p:tgtEl>
+                                          <p:spTgt spid="24"/>
+                                        </p:tgtEl>
+                                        <p:attrNameLst>
+                                          <p:attrName>fill.type</p:attrName>
+                                        </p:attrNameLst>
+                                      </p:cBhvr>
+                                      <p:to>
+                                        <p:strVal val="solid"/>
+                                      </p:to>
+                                    </p:set>
+                                    <p:set>
+                                      <p:cBhvr>
+                                        <p:cTn id="74" dur="1000" fill="hold"/>
+                                        <p:tgtEl>
+                                          <p:spTgt spid="24"/>
+                                        </p:tgtEl>
+                                        <p:attrNameLst>
+                                          <p:attrName>fill.on</p:attrName>
+                                        </p:attrNameLst>
+                                      </p:cBhvr>
+                                      <p:to>
+                                        <p:strVal val="true"/>
+                                      </p:to>
+                                    </p:set>
+                                  </p:childTnLst>
+                                </p:cTn>
+                              </p:par>
+                              <p:par>
+                                <p:cTn id="75" presetID="1" presetClass="emph" presetSubtype="2" fill="hold" nodeType="withEffect">
+                                  <p:stCondLst>
+                                    <p:cond delay="0"/>
+                                  </p:stCondLst>
+                                  <p:childTnLst>
+                                    <p:animClr clrSpc="rgb" dir="cw">
+                                      <p:cBhvr>
+                                        <p:cTn id="76" dur="1000" fill="hold"/>
+                                        <p:tgtEl>
+                                          <p:spTgt spid="22"/>
+                                        </p:tgtEl>
+                                        <p:attrNameLst>
+                                          <p:attrName>fillcolor</p:attrName>
+                                        </p:attrNameLst>
+                                      </p:cBhvr>
+                                      <p:to>
+                                        <a:schemeClr val="accent2"/>
+                                      </p:to>
+                                    </p:animClr>
+                                    <p:set>
+                                      <p:cBhvr>
+                                        <p:cTn id="77" dur="1000" fill="hold"/>
+                                        <p:tgtEl>
+                                          <p:spTgt spid="22"/>
+                                        </p:tgtEl>
+                                        <p:attrNameLst>
+                                          <p:attrName>fill.type</p:attrName>
+                                        </p:attrNameLst>
+                                      </p:cBhvr>
+                                      <p:to>
+                                        <p:strVal val="solid"/>
+                                      </p:to>
+                                    </p:set>
+                                    <p:set>
+                                      <p:cBhvr>
+                                        <p:cTn id="78" dur="1000" fill="hold"/>
+                                        <p:tgtEl>
+                                          <p:spTgt spid="22"/>
+                                        </p:tgtEl>
+                                        <p:attrNameLst>
+                                          <p:attrName>fill.on</p:attrName>
+                                        </p:attrNameLst>
+                                      </p:cBhvr>
+                                      <p:to>
+                                        <p:strVal val="true"/>
+                                      </p:to>
+                                    </p:set>
+                                  </p:childTnLst>
+                                </p:cTn>
+                              </p:par>
+                            </p:childTnLst>
+                          </p:cTn>
+                        </p:par>
+                      </p:childTnLst>
+                    </p:cTn>
+                  </p:par>
+                  <p:par>
+                    <p:cTn id="79" fill="hold">
+                      <p:stCondLst>
+                        <p:cond delay="indefinite"/>
+                      </p:stCondLst>
+                      <p:childTnLst>
+                        <p:par>
+                          <p:cTn id="80" fill="hold">
+                            <p:stCondLst>
+                              <p:cond delay="0"/>
+                            </p:stCondLst>
+                            <p:childTnLst>
+                              <p:par>
+                                <p:cTn id="81" presetID="1" presetClass="emph" presetSubtype="2" fill="hold" nodeType="clickEffect">
+                                  <p:stCondLst>
+                                    <p:cond delay="0"/>
+                                  </p:stCondLst>
+                                  <p:childTnLst>
+                                    <p:animClr clrSpc="rgb" dir="cw">
+                                      <p:cBhvr>
+                                        <p:cTn id="82" dur="1000" fill="hold"/>
+                                        <p:tgtEl>
+                                          <p:spTgt spid="7"/>
+                                        </p:tgtEl>
+                                        <p:attrNameLst>
+                                          <p:attrName>fillcolor</p:attrName>
+                                        </p:attrNameLst>
+                                      </p:cBhvr>
+                                      <p:to>
+                                        <a:schemeClr val="hlink"/>
+                                      </p:to>
+                                    </p:animClr>
+                                    <p:set>
+                                      <p:cBhvr>
+                                        <p:cTn id="83" dur="1000" fill="hold"/>
+                                        <p:tgtEl>
+                                          <p:spTgt spid="7"/>
+                                        </p:tgtEl>
+                                        <p:attrNameLst>
+                                          <p:attrName>fill.type</p:attrName>
+                                        </p:attrNameLst>
+                                      </p:cBhvr>
+                                      <p:to>
+                                        <p:strVal val="solid"/>
+                                      </p:to>
+                                    </p:set>
+                                    <p:set>
+                                      <p:cBhvr>
+                                        <p:cTn id="84" dur="1000" fill="hold"/>
+                                        <p:tgtEl>
+                                          <p:spTgt spid="7"/>
+                                        </p:tgtEl>
+                                        <p:attrNameLst>
+                                          <p:attrName>fill.on</p:attrName>
+                                        </p:attrNameLst>
+                                      </p:cBhvr>
+                                      <p:to>
+                                        <p:strVal val="true"/>
+                                      </p:to>
+                                    </p:set>
+                                  </p:childTnLst>
+                                </p:cTn>
+                              </p:par>
+                            </p:childTnLst>
+                          </p:cTn>
+                        </p:par>
+                      </p:childTnLst>
+                    </p:cTn>
+                  </p:par>
+                  <p:par>
+                    <p:cTn id="85" fill="hold">
+                      <p:stCondLst>
+                        <p:cond delay="indefinite"/>
+                      </p:stCondLst>
+                      <p:childTnLst>
+                        <p:par>
+                          <p:cTn id="86" fill="hold">
+                            <p:stCondLst>
+                              <p:cond delay="0"/>
+                            </p:stCondLst>
+                            <p:childTnLst>
+                              <p:par>
+                                <p:cTn id="87" presetID="1" presetClass="emph" presetSubtype="2" fill="hold" nodeType="clickEffect">
+                                  <p:stCondLst>
+                                    <p:cond delay="0"/>
+                                  </p:stCondLst>
+                                  <p:childTnLst>
+                                    <p:animClr clrSpc="rgb" dir="cw">
+                                      <p:cBhvr>
+                                        <p:cTn id="88" dur="1000" fill="hold"/>
+                                        <p:tgtEl>
+                                          <p:spTgt spid="8"/>
+                                        </p:tgtEl>
+                                        <p:attrNameLst>
+                                          <p:attrName>fillcolor</p:attrName>
+                                        </p:attrNameLst>
+                                      </p:cBhvr>
+                                      <p:to>
+                                        <a:schemeClr val="hlink"/>
+                                      </p:to>
+                                    </p:animClr>
+                                    <p:set>
+                                      <p:cBhvr>
+                                        <p:cTn id="89" dur="1000" fill="hold"/>
+                                        <p:tgtEl>
+                                          <p:spTgt spid="8"/>
+                                        </p:tgtEl>
+                                        <p:attrNameLst>
+                                          <p:attrName>fill.type</p:attrName>
+                                        </p:attrNameLst>
+                                      </p:cBhvr>
+                                      <p:to>
+                                        <p:strVal val="solid"/>
+                                      </p:to>
+                                    </p:set>
+                                    <p:set>
+                                      <p:cBhvr>
+                                        <p:cTn id="90" dur="1000" fill="hold"/>
+                                        <p:tgtEl>
+                                          <p:spTgt spid="8"/>
+                                        </p:tgtEl>
+                                        <p:attrNameLst>
+                                          <p:attrName>fill.on</p:attrName>
+                                        </p:attrNameLst>
+                                      </p:cBhvr>
+                                      <p:to>
+                                        <p:strVal val="true"/>
+                                      </p:to>
+                                    </p:set>
+                                  </p:childTnLst>
+                                </p:cTn>
+                              </p:par>
+                            </p:childTnLst>
+                          </p:cTn>
+                        </p:par>
+                      </p:childTnLst>
+                    </p:cTn>
+                  </p:par>
+                  <p:par>
+                    <p:cTn id="91" fill="hold">
+                      <p:stCondLst>
+                        <p:cond delay="indefinite"/>
+                      </p:stCondLst>
+                      <p:childTnLst>
+                        <p:par>
+                          <p:cTn id="92" fill="hold">
+                            <p:stCondLst>
+                              <p:cond delay="0"/>
+                            </p:stCondLst>
+                            <p:childTnLst>
+                              <p:par>
+                                <p:cTn id="93" presetID="1" presetClass="emph" presetSubtype="2" fill="hold" nodeType="clickEffect">
+                                  <p:stCondLst>
+                                    <p:cond delay="0"/>
+                                  </p:stCondLst>
+                                  <p:childTnLst>
+                                    <p:animClr clrSpc="rgb" dir="cw">
+                                      <p:cBhvr>
+                                        <p:cTn id="94" dur="2000" fill="hold"/>
+                                        <p:tgtEl>
+                                          <p:spTgt spid="18"/>
+                                        </p:tgtEl>
+                                        <p:attrNameLst>
+                                          <p:attrName>fillcolor</p:attrName>
+                                        </p:attrNameLst>
+                                      </p:cBhvr>
+                                      <p:to>
+                                        <a:schemeClr val="hlink"/>
+                                      </p:to>
+                                    </p:animClr>
+                                    <p:set>
+                                      <p:cBhvr>
+                                        <p:cTn id="95" dur="2000" fill="hold"/>
+                                        <p:tgtEl>
+                                          <p:spTgt spid="18"/>
+                                        </p:tgtEl>
+                                        <p:attrNameLst>
+                                          <p:attrName>fill.type</p:attrName>
+                                        </p:attrNameLst>
+                                      </p:cBhvr>
+                                      <p:to>
+                                        <p:strVal val="solid"/>
+                                      </p:to>
+                                    </p:set>
+                                    <p:set>
+                                      <p:cBhvr>
+                                        <p:cTn id="96" dur="2000" fill="hold"/>
+                                        <p:tgtEl>
+                                          <p:spTgt spid="18"/>
+                                        </p:tgtEl>
+                                        <p:attrNameLst>
+                                          <p:attrName>fill.on</p:attrName>
+                                        </p:attrNameLst>
+                                      </p:cBhvr>
+                                      <p:to>
+                                        <p:strVal val="true"/>
+                                      </p:to>
+                                    </p:set>
+                                  </p:childTnLst>
+                                </p:cTn>
+                              </p:par>
+                            </p:childTnLst>
+                          </p:cTn>
+                        </p:par>
+                      </p:childTnLst>
+                    </p:cTn>
+                  </p:par>
+                  <p:par>
+                    <p:cTn id="97" fill="hold">
+                      <p:stCondLst>
+                        <p:cond delay="indefinite"/>
+                      </p:stCondLst>
+                      <p:childTnLst>
+                        <p:par>
+                          <p:cTn id="98" fill="hold">
+                            <p:stCondLst>
+                              <p:cond delay="0"/>
+                            </p:stCondLst>
+                            <p:childTnLst>
+                              <p:par>
+                                <p:cTn id="99" presetID="1" presetClass="emph" presetSubtype="2" fill="hold" nodeType="clickEffect">
+                                  <p:stCondLst>
+                                    <p:cond delay="0"/>
+                                  </p:stCondLst>
+                                  <p:childTnLst>
+                                    <p:animClr clrSpc="rgb" dir="cw">
+                                      <p:cBhvr>
+                                        <p:cTn id="100" dur="2000" fill="hold"/>
+                                        <p:tgtEl>
+                                          <p:spTgt spid="9"/>
+                                        </p:tgtEl>
+                                        <p:attrNameLst>
+                                          <p:attrName>fillcolor</p:attrName>
+                                        </p:attrNameLst>
+                                      </p:cBhvr>
+                                      <p:to>
+                                        <a:schemeClr val="hlink"/>
+                                      </p:to>
+                                    </p:animClr>
+                                    <p:set>
+                                      <p:cBhvr>
+                                        <p:cTn id="101" dur="2000" fill="hold"/>
+                                        <p:tgtEl>
+                                          <p:spTgt spid="9"/>
+                                        </p:tgtEl>
+                                        <p:attrNameLst>
+                                          <p:attrName>fill.type</p:attrName>
+                                        </p:attrNameLst>
+                                      </p:cBhvr>
+                                      <p:to>
+                                        <p:strVal val="solid"/>
+                                      </p:to>
+                                    </p:set>
+                                    <p:set>
+                                      <p:cBhvr>
+                                        <p:cTn id="102" dur="2000" fill="hold"/>
+                                        <p:tgtEl>
+                                          <p:spTgt spid="9"/>
+                                        </p:tgtEl>
+                                        <p:attrNameLst>
+                                          <p:attrName>fill.on</p:attrName>
+                                        </p:attrNameLst>
+                                      </p:cBhvr>
+                                      <p:to>
+                                        <p:strVal val="true"/>
+                                      </p:to>
+                                    </p:set>
+                                  </p:childTnLst>
+                                </p:cTn>
+                              </p:par>
+                            </p:childTnLst>
+                          </p:cTn>
+                        </p:par>
+                      </p:childTnLst>
+                    </p:cTn>
+                  </p:par>
+                </p:childTnLst>
+              </p:cTn>
+              <p:prevCondLst>
+                <p:cond evt="onPrev" delay="0">
+                  <p:tgtEl>
+                    <p:sldTgt/>
+                  </p:tgtEl>
+                </p:cond>
+              </p:prevCondLst>
+              <p:nextCondLst>
+                <p:cond evt="onNext" delay="0">
+                  <p:tgtEl>
+                    <p:sldTgt/>
+                  </p:tgtEl>
+                </p:cond>
+              </p:nextCondLst>
+            </p:seq>
+          </p:childTnLst>
+        </p:cTn>
+      </p:par>
+    </p:tnLst>
+  </p:timing>
+</p:sld>
+</file>
+
+<file path=ppt/slides/slide12.xml><?xml version="1.0" encoding="utf-8"?>
+<p:sld xmlns:a="http://schemas.openxmlformats.org/drawingml/2006/main" xmlns:r="http://schemas.openxmlformats.org/officeDocument/2006/relationships" xmlns:p="http://schemas.openxmlformats.org/presentationml/2006/main">
+  <p:cSld>
+    <p:spTree>
+      <p:nvGrpSpPr>
+        <p:cNvPr id="1" name=""/>
+        <p:cNvGrpSpPr/>
+        <p:nvPr/>
+      </p:nvGrpSpPr>
+      <p:grpSpPr>
+        <a:xfrm>
+          <a:off x="0" y="0"/>
+          <a:ext cx="0" cy="0"/>
+          <a:chOff x="0" y="0"/>
+          <a:chExt cx="0" cy="0"/>
+        </a:xfrm>
+      </p:grpSpPr>
+      <p:sp>
+        <p:nvSpPr>
+          <p:cNvPr id="2" name="Title 1"/>
+          <p:cNvSpPr>
+            <a:spLocks noGrp="1"/>
+          </p:cNvSpPr>
+          <p:nvPr>
+            <p:ph type="title"/>
+          </p:nvPr>
+        </p:nvSpPr>
+        <p:spPr/>
+        <p:txBody>
+          <a:bodyPr/>
+          <a:lstStyle/>
+          <a:p>
+            <a:r>
+              <a:rPr lang="en-US" dirty="0" smtClean="0"/>
+              <a:t>What about memory?</a:t>
+            </a:r>
+            <a:endParaRPr lang="en-US" dirty="0"/>
+          </a:p>
+        </p:txBody>
+      </p:sp>
+      <p:sp>
+        <p:nvSpPr>
+          <p:cNvPr id="6" name="Content Placeholder 5"/>
+          <p:cNvSpPr>
+            <a:spLocks noGrp="1"/>
+          </p:cNvSpPr>
+          <p:nvPr>
+            <p:ph idx="1"/>
+          </p:nvPr>
+        </p:nvSpPr>
+        <p:spPr/>
+        <p:txBody>
+          <a:bodyPr/>
+          <a:lstStyle/>
+          <a:p>
+            <a:r>
+              <a:rPr lang="en-US" dirty="0" smtClean="0"/>
+              <a:t>Copying data is expensive</a:t>
+            </a:r>
+          </a:p>
+          <a:p>
+            <a:pPr lvl="1"/>
+            <a:r>
+              <a:rPr lang="en-US" dirty="0" smtClean="0"/>
+              <a:t>Or at least it used to be</a:t>
+            </a:r>
+          </a:p>
+          <a:p>
+            <a:r>
+              <a:rPr lang="en-US" dirty="0" smtClean="0"/>
+              <a:t>Zero copy is complicated</a:t>
+            </a:r>
+          </a:p>
+          <a:p>
+            <a:pPr lvl="1"/>
+            <a:r>
+              <a:rPr lang="en-US" dirty="0" smtClean="0"/>
+              <a:t>Replacing a jet engine while in flight</a:t>
+            </a:r>
+          </a:p>
+          <a:p>
+            <a:endParaRPr lang="en-US" dirty="0" smtClean="0"/>
+          </a:p>
+        </p:txBody>
+      </p:sp>
+      <p:sp>
+        <p:nvSpPr>
+          <p:cNvPr id="3" name="Date Placeholder 2"/>
+          <p:cNvSpPr>
+            <a:spLocks noGrp="1"/>
+          </p:cNvSpPr>
+          <p:nvPr>
+            <p:ph type="dt" sz="half" idx="10"/>
+          </p:nvPr>
+        </p:nvSpPr>
+        <p:spPr/>
+        <p:txBody>
+          <a:bodyPr/>
+          <a:lstStyle/>
+          <a:p>
+            <a:fld id="{9FC8F57C-E466-5D4A-8BA1-0F2DC96E6599}" type="datetime1">
+              <a:rPr lang="en-US" smtClean="0"/>
+              <a:t>2/4/17</a:t>
+            </a:fld>
+            <a:endParaRPr lang="en-US"/>
+          </a:p>
+        </p:txBody>
+      </p:sp>
+      <p:sp>
+        <p:nvSpPr>
+          <p:cNvPr id="4" name="Footer Placeholder 3"/>
+          <p:cNvSpPr>
+            <a:spLocks noGrp="1"/>
+          </p:cNvSpPr>
+          <p:nvPr>
+            <p:ph type="ftr" sz="quarter" idx="11"/>
+          </p:nvPr>
+        </p:nvSpPr>
+        <p:spPr/>
+        <p:txBody>
+          <a:bodyPr/>
+          <a:lstStyle/>
+          <a:p>
+            <a:r>
+              <a:rPr lang="en-US" smtClean="0"/>
+              <a:t>Developing Products with FreeBSD</a:t>
+            </a:r>
+            <a:endParaRPr lang="en-US"/>
+          </a:p>
+        </p:txBody>
+      </p:sp>
+      <p:sp>
+        <p:nvSpPr>
+          <p:cNvPr id="5" name="Slide Number Placeholder 4"/>
+          <p:cNvSpPr>
+            <a:spLocks noGrp="1"/>
+          </p:cNvSpPr>
+          <p:nvPr>
+            <p:ph type="sldNum" sz="quarter" idx="12"/>
+          </p:nvPr>
+        </p:nvSpPr>
+        <p:spPr/>
+        <p:txBody>
+          <a:bodyPr/>
+          <a:lstStyle/>
+          <a:p>
+            <a:fld id="{699C44C4-0FAD-8046-A5C4-05AB318FA424}" type="slidenum">
+              <a:rPr lang="en-US" smtClean="0"/>
+              <a:t>12</a:t>
+            </a:fld>
+            <a:endParaRPr lang="en-US"/>
+          </a:p>
+        </p:txBody>
+      </p:sp>
+    </p:spTree>
+    <p:extLst>
+      <p:ext uri="{BB962C8B-B14F-4D97-AF65-F5344CB8AC3E}">
+        <p14:creationId xmlns:p14="http://schemas.microsoft.com/office/powerpoint/2010/main" val="111795681"/>
+      </p:ext>
+    </p:extLst>
+  </p:cSld>
+  <p:clrMapOvr>
+    <a:masterClrMapping/>
+  </p:clrMapOvr>
+  <p:timing>
+    <p:tnLst>
+      <p:par>
+        <p:cTn id="1" dur="indefinite" restart="never" nodeType="tmRoot"/>
+      </p:par>
+    </p:tnLst>
+  </p:timing>
+</p:sld>
+</file>
+
+<file path=ppt/slides/slide13.xml><?xml version="1.0" encoding="utf-8"?>
+<p:sld xmlns:a="http://schemas.openxmlformats.org/drawingml/2006/main" xmlns:r="http://schemas.openxmlformats.org/officeDocument/2006/relationships" xmlns:p="http://schemas.openxmlformats.org/presentationml/2006/main">
+  <p:cSld>
+    <p:spTree>
+      <p:nvGrpSpPr>
+        <p:cNvPr id="1" name=""/>
+        <p:cNvGrpSpPr/>
+        <p:nvPr/>
+      </p:nvGrpSpPr>
+      <p:grpSpPr>
+        <a:xfrm>
+          <a:off x="0" y="0"/>
+          <a:ext cx="0" cy="0"/>
+          <a:chOff x="0" y="0"/>
+          <a:chExt cx="0" cy="0"/>
+        </a:xfrm>
+      </p:grpSpPr>
+      <p:sp>
+        <p:nvSpPr>
+          <p:cNvPr id="2" name="Title 1"/>
+          <p:cNvSpPr>
+            <a:spLocks noGrp="1"/>
+          </p:cNvSpPr>
+          <p:nvPr>
+            <p:ph type="title"/>
+          </p:nvPr>
+        </p:nvSpPr>
+        <p:spPr/>
+        <p:txBody>
+          <a:bodyPr/>
+          <a:lstStyle/>
+          <a:p>
+            <a:r>
+              <a:rPr lang="en-US" dirty="0" smtClean="0"/>
+              <a:t>Memory Swapping</a:t>
+            </a:r>
+            <a:endParaRPr lang="en-US" dirty="0"/>
+          </a:p>
+        </p:txBody>
+      </p:sp>
+      <p:sp>
+        <p:nvSpPr>
+          <p:cNvPr id="4" name="Date Placeholder 3"/>
+          <p:cNvSpPr>
+            <a:spLocks noGrp="1"/>
+          </p:cNvSpPr>
+          <p:nvPr>
+            <p:ph type="dt" sz="half" idx="10"/>
+          </p:nvPr>
+        </p:nvSpPr>
+        <p:spPr/>
+        <p:txBody>
+          <a:bodyPr/>
+          <a:lstStyle/>
+          <a:p>
+            <a:fld id="{BC4AE5AA-C6FF-5A4F-9D02-E3454F0B3602}" type="datetime1">
+              <a:rPr lang="en-US" smtClean="0"/>
+              <a:t>2/4/17</a:t>
+            </a:fld>
+            <a:endParaRPr lang="en-US"/>
+          </a:p>
+        </p:txBody>
+      </p:sp>
+      <p:sp>
+        <p:nvSpPr>
+          <p:cNvPr id="5" name="Footer Placeholder 4"/>
+          <p:cNvSpPr>
+            <a:spLocks noGrp="1"/>
+          </p:cNvSpPr>
+          <p:nvPr>
+            <p:ph type="ftr" sz="quarter" idx="11"/>
+          </p:nvPr>
+        </p:nvSpPr>
+        <p:spPr/>
+        <p:txBody>
+          <a:bodyPr/>
+          <a:lstStyle/>
+          <a:p>
+            <a:r>
+              <a:rPr lang="en-US" smtClean="0"/>
+              <a:t>Developing Products with FreeBSD</a:t>
+            </a:r>
+            <a:endParaRPr lang="en-US" dirty="0"/>
+          </a:p>
+        </p:txBody>
+      </p:sp>
+      <p:sp>
+        <p:nvSpPr>
+          <p:cNvPr id="6" name="Slide Number Placeholder 5"/>
+          <p:cNvSpPr>
+            <a:spLocks noGrp="1"/>
+          </p:cNvSpPr>
+          <p:nvPr>
+            <p:ph type="sldNum" sz="quarter" idx="12"/>
+          </p:nvPr>
+        </p:nvSpPr>
+        <p:spPr/>
+        <p:txBody>
+          <a:bodyPr/>
+          <a:lstStyle/>
+          <a:p>
+            <a:fld id="{699C44C4-0FAD-8046-A5C4-05AB318FA424}" type="slidenum">
+              <a:rPr lang="en-US" smtClean="0"/>
+              <a:t>13</a:t>
+            </a:fld>
+            <a:endParaRPr lang="en-US"/>
+          </a:p>
+        </p:txBody>
+      </p:sp>
+      <p:sp>
+        <p:nvSpPr>
+          <p:cNvPr id="7" name="Rectangle 6"/>
+          <p:cNvSpPr/>
+          <p:nvPr/>
+        </p:nvSpPr>
+        <p:spPr>
+          <a:xfrm>
+            <a:off x="3987210" y="1648045"/>
+            <a:ext cx="1339702" cy="531628"/>
+          </a:xfrm>
+          <a:prstGeom prst="rect">
+            <a:avLst/>
+          </a:prstGeom>
+          <a:solidFill>
+            <a:srgbClr val="00B050"/>
+          </a:solidFill>
+          <a:ln>
+            <a:solidFill>
+              <a:schemeClr val="bg1"/>
+            </a:solidFill>
+          </a:ln>
+        </p:spPr>
+        <p:style>
+          <a:lnRef idx="2">
+            <a:schemeClr val="accent1">
+              <a:shade val="50000"/>
+            </a:schemeClr>
+          </a:lnRef>
+          <a:fillRef idx="1">
+            <a:schemeClr val="accent1"/>
+          </a:fillRef>
+          <a:effectRef idx="0">
+            <a:schemeClr val="accent1"/>
+          </a:effectRef>
+          <a:fontRef idx="minor">
+            <a:schemeClr val="lt1"/>
+          </a:fontRef>
+        </p:style>
+        <p:txBody>
+          <a:bodyPr rtlCol="0" anchor="ctr"/>
+          <a:lstStyle/>
+          <a:p>
+            <a:pPr algn="ctr"/>
+            <a:r>
+              <a:rPr lang="en-US" dirty="0" smtClean="0"/>
+              <a:t>Descriptor</a:t>
+            </a:r>
+            <a:endParaRPr lang="en-US" dirty="0"/>
+          </a:p>
+        </p:txBody>
+      </p:sp>
+      <p:sp>
+        <p:nvSpPr>
+          <p:cNvPr id="8" name="Rectangle 7"/>
+          <p:cNvSpPr/>
+          <p:nvPr/>
+        </p:nvSpPr>
+        <p:spPr>
+          <a:xfrm>
+            <a:off x="6671745" y="1634945"/>
+            <a:ext cx="1339702" cy="531628"/>
+          </a:xfrm>
+          <a:prstGeom prst="rect">
+            <a:avLst/>
+          </a:prstGeom>
+          <a:solidFill>
+            <a:srgbClr val="00B050"/>
+          </a:solidFill>
+          <a:ln>
+            <a:solidFill>
+              <a:schemeClr val="bg1"/>
+            </a:solidFill>
+          </a:ln>
+        </p:spPr>
+        <p:style>
+          <a:lnRef idx="2">
+            <a:schemeClr val="accent1">
+              <a:shade val="50000"/>
+            </a:schemeClr>
+          </a:lnRef>
+          <a:fillRef idx="1">
+            <a:schemeClr val="accent1"/>
+          </a:fillRef>
+          <a:effectRef idx="0">
+            <a:schemeClr val="accent1"/>
+          </a:effectRef>
+          <a:fontRef idx="minor">
+            <a:schemeClr val="lt1"/>
+          </a:fontRef>
+        </p:style>
+        <p:txBody>
+          <a:bodyPr rtlCol="0" anchor="ctr"/>
+          <a:lstStyle/>
+          <a:p>
+            <a:pPr algn="ctr"/>
+            <a:r>
+              <a:rPr lang="en-US" dirty="0" smtClean="0"/>
+              <a:t>Data</a:t>
+            </a:r>
+            <a:endParaRPr lang="en-US" dirty="0"/>
+          </a:p>
+        </p:txBody>
+      </p:sp>
+      <p:sp>
+        <p:nvSpPr>
+          <p:cNvPr id="9" name="Rectangle 8"/>
+          <p:cNvSpPr/>
+          <p:nvPr/>
+        </p:nvSpPr>
+        <p:spPr>
+          <a:xfrm>
+            <a:off x="6671745" y="2166573"/>
+            <a:ext cx="1339702" cy="531628"/>
+          </a:xfrm>
+          <a:prstGeom prst="rect">
+            <a:avLst/>
+          </a:prstGeom>
+          <a:solidFill>
+            <a:srgbClr val="00B050"/>
+          </a:solidFill>
+          <a:ln>
+            <a:solidFill>
+              <a:schemeClr val="bg1"/>
+            </a:solidFill>
+          </a:ln>
+        </p:spPr>
+        <p:style>
+          <a:lnRef idx="2">
+            <a:schemeClr val="accent1">
+              <a:shade val="50000"/>
+            </a:schemeClr>
+          </a:lnRef>
+          <a:fillRef idx="1">
+            <a:schemeClr val="accent1"/>
+          </a:fillRef>
+          <a:effectRef idx="0">
+            <a:schemeClr val="accent1"/>
+          </a:effectRef>
+          <a:fontRef idx="minor">
+            <a:schemeClr val="lt1"/>
+          </a:fontRef>
+        </p:style>
+        <p:txBody>
+          <a:bodyPr rtlCol="0" anchor="ctr"/>
+          <a:lstStyle/>
+          <a:p>
+            <a:pPr algn="ctr"/>
+            <a:r>
+              <a:rPr lang="en-US" dirty="0" smtClean="0"/>
+              <a:t>Data</a:t>
+            </a:r>
+            <a:endParaRPr lang="en-US" dirty="0"/>
+          </a:p>
+        </p:txBody>
+      </p:sp>
+      <p:sp>
+        <p:nvSpPr>
+          <p:cNvPr id="10" name="Rectangle 9"/>
+          <p:cNvSpPr/>
+          <p:nvPr/>
+        </p:nvSpPr>
+        <p:spPr>
+          <a:xfrm>
+            <a:off x="6671745" y="2698201"/>
+            <a:ext cx="1339702" cy="531628"/>
+          </a:xfrm>
+          <a:prstGeom prst="rect">
+            <a:avLst/>
+          </a:prstGeom>
+          <a:solidFill>
+            <a:srgbClr val="00B050"/>
+          </a:solidFill>
+          <a:ln>
+            <a:solidFill>
+              <a:schemeClr val="bg1"/>
+            </a:solidFill>
+          </a:ln>
+        </p:spPr>
+        <p:style>
+          <a:lnRef idx="2">
+            <a:schemeClr val="accent1">
+              <a:shade val="50000"/>
+            </a:schemeClr>
+          </a:lnRef>
+          <a:fillRef idx="1">
+            <a:schemeClr val="accent1"/>
+          </a:fillRef>
+          <a:effectRef idx="0">
+            <a:schemeClr val="accent1"/>
+          </a:effectRef>
+          <a:fontRef idx="minor">
+            <a:schemeClr val="lt1"/>
+          </a:fontRef>
+        </p:style>
+        <p:txBody>
+          <a:bodyPr rtlCol="0" anchor="ctr"/>
+          <a:lstStyle/>
+          <a:p>
+            <a:pPr algn="ctr"/>
+            <a:r>
+              <a:rPr lang="en-US" dirty="0" smtClean="0"/>
+              <a:t>Data</a:t>
+            </a:r>
+            <a:endParaRPr lang="en-US" dirty="0"/>
+          </a:p>
+        </p:txBody>
+      </p:sp>
+      <p:sp>
+        <p:nvSpPr>
+          <p:cNvPr id="11" name="Rectangle 10"/>
+          <p:cNvSpPr/>
+          <p:nvPr/>
+        </p:nvSpPr>
+        <p:spPr>
+          <a:xfrm>
+            <a:off x="6671745" y="3229829"/>
+            <a:ext cx="1339702" cy="531628"/>
+          </a:xfrm>
+          <a:prstGeom prst="rect">
+            <a:avLst/>
+          </a:prstGeom>
+          <a:solidFill>
+            <a:srgbClr val="00B050"/>
+          </a:solidFill>
+          <a:ln>
+            <a:solidFill>
+              <a:schemeClr val="bg1"/>
+            </a:solidFill>
+          </a:ln>
+        </p:spPr>
+        <p:style>
+          <a:lnRef idx="2">
+            <a:schemeClr val="accent1">
+              <a:shade val="50000"/>
+            </a:schemeClr>
+          </a:lnRef>
+          <a:fillRef idx="1">
+            <a:schemeClr val="accent1"/>
+          </a:fillRef>
+          <a:effectRef idx="0">
+            <a:schemeClr val="accent1"/>
+          </a:effectRef>
+          <a:fontRef idx="minor">
+            <a:schemeClr val="lt1"/>
+          </a:fontRef>
+        </p:style>
+        <p:txBody>
+          <a:bodyPr rtlCol="0" anchor="ctr"/>
+          <a:lstStyle/>
+          <a:p>
+            <a:pPr algn="ctr"/>
+            <a:r>
+              <a:rPr lang="en-US" dirty="0" smtClean="0"/>
+              <a:t>Data</a:t>
+            </a:r>
+            <a:endParaRPr lang="en-US" dirty="0"/>
+          </a:p>
+        </p:txBody>
+      </p:sp>
+      <p:sp>
+        <p:nvSpPr>
+          <p:cNvPr id="13" name="Rectangle 12"/>
+          <p:cNvSpPr/>
+          <p:nvPr/>
+        </p:nvSpPr>
+        <p:spPr>
+          <a:xfrm>
+            <a:off x="6671745" y="3761457"/>
+            <a:ext cx="1339702" cy="531628"/>
+          </a:xfrm>
+          <a:prstGeom prst="rect">
+            <a:avLst/>
+          </a:prstGeom>
+          <a:solidFill>
+            <a:srgbClr val="00B050"/>
+          </a:solidFill>
+          <a:ln>
+            <a:solidFill>
+              <a:schemeClr val="bg1"/>
+            </a:solidFill>
+          </a:ln>
+        </p:spPr>
+        <p:style>
+          <a:lnRef idx="2">
+            <a:schemeClr val="accent1">
+              <a:shade val="50000"/>
+            </a:schemeClr>
+          </a:lnRef>
+          <a:fillRef idx="1">
+            <a:schemeClr val="accent1"/>
+          </a:fillRef>
+          <a:effectRef idx="0">
+            <a:schemeClr val="accent1"/>
+          </a:effectRef>
+          <a:fontRef idx="minor">
+            <a:schemeClr val="lt1"/>
+          </a:fontRef>
+        </p:style>
+        <p:txBody>
+          <a:bodyPr rtlCol="0" anchor="ctr"/>
+          <a:lstStyle/>
+          <a:p>
+            <a:pPr algn="ctr"/>
+            <a:r>
+              <a:rPr lang="en-US" dirty="0" smtClean="0"/>
+              <a:t>Data</a:t>
+            </a:r>
+            <a:endParaRPr lang="en-US" dirty="0"/>
+          </a:p>
+        </p:txBody>
+      </p:sp>
+      <p:sp>
+        <p:nvSpPr>
+          <p:cNvPr id="14" name="Rectangle 13"/>
+          <p:cNvSpPr/>
+          <p:nvPr/>
+        </p:nvSpPr>
+        <p:spPr>
+          <a:xfrm>
+            <a:off x="6671745" y="4293085"/>
+            <a:ext cx="1339702" cy="531628"/>
+          </a:xfrm>
+          <a:prstGeom prst="rect">
+            <a:avLst/>
+          </a:prstGeom>
+          <a:solidFill>
+            <a:srgbClr val="00B050"/>
+          </a:solidFill>
+          <a:ln>
+            <a:solidFill>
+              <a:schemeClr val="bg1"/>
+            </a:solidFill>
+          </a:ln>
+        </p:spPr>
+        <p:style>
+          <a:lnRef idx="2">
+            <a:schemeClr val="accent1">
+              <a:shade val="50000"/>
+            </a:schemeClr>
+          </a:lnRef>
+          <a:fillRef idx="1">
+            <a:schemeClr val="accent1"/>
+          </a:fillRef>
+          <a:effectRef idx="0">
+            <a:schemeClr val="accent1"/>
+          </a:effectRef>
+          <a:fontRef idx="minor">
+            <a:schemeClr val="lt1"/>
+          </a:fontRef>
+        </p:style>
+        <p:txBody>
+          <a:bodyPr rtlCol="0" anchor="ctr"/>
+          <a:lstStyle/>
+          <a:p>
+            <a:pPr algn="ctr"/>
+            <a:r>
+              <a:rPr lang="en-US" dirty="0" smtClean="0"/>
+              <a:t>Data</a:t>
+            </a:r>
+            <a:endParaRPr lang="en-US" dirty="0"/>
+          </a:p>
+        </p:txBody>
+      </p:sp>
+      <p:sp>
+        <p:nvSpPr>
+          <p:cNvPr id="15" name="Rectangle 14"/>
+          <p:cNvSpPr/>
+          <p:nvPr/>
+        </p:nvSpPr>
+        <p:spPr>
+          <a:xfrm>
+            <a:off x="6671745" y="4824713"/>
+            <a:ext cx="1339702" cy="531628"/>
+          </a:xfrm>
+          <a:prstGeom prst="rect">
+            <a:avLst/>
+          </a:prstGeom>
+          <a:solidFill>
+            <a:srgbClr val="00B050"/>
+          </a:solidFill>
+          <a:ln>
+            <a:solidFill>
+              <a:schemeClr val="bg1"/>
+            </a:solidFill>
+          </a:ln>
+        </p:spPr>
+        <p:style>
+          <a:lnRef idx="2">
+            <a:schemeClr val="accent1">
+              <a:shade val="50000"/>
+            </a:schemeClr>
+          </a:lnRef>
+          <a:fillRef idx="1">
+            <a:schemeClr val="accent1"/>
+          </a:fillRef>
+          <a:effectRef idx="0">
+            <a:schemeClr val="accent1"/>
+          </a:effectRef>
+          <a:fontRef idx="minor">
+            <a:schemeClr val="lt1"/>
+          </a:fontRef>
+        </p:style>
+        <p:txBody>
+          <a:bodyPr rtlCol="0" anchor="ctr"/>
+          <a:lstStyle/>
+          <a:p>
+            <a:pPr algn="ctr"/>
+            <a:r>
+              <a:rPr lang="en-US" dirty="0" smtClean="0"/>
+              <a:t>Data</a:t>
+            </a:r>
+            <a:endParaRPr lang="en-US" dirty="0"/>
+          </a:p>
+        </p:txBody>
+      </p:sp>
+      <p:sp>
+        <p:nvSpPr>
+          <p:cNvPr id="16" name="Rectangle 15"/>
+          <p:cNvSpPr/>
+          <p:nvPr/>
+        </p:nvSpPr>
+        <p:spPr>
+          <a:xfrm>
+            <a:off x="6671745" y="5356341"/>
+            <a:ext cx="1339702" cy="531628"/>
+          </a:xfrm>
+          <a:prstGeom prst="rect">
+            <a:avLst/>
+          </a:prstGeom>
+          <a:solidFill>
+            <a:srgbClr val="00B050"/>
+          </a:solidFill>
+          <a:ln>
+            <a:solidFill>
+              <a:schemeClr val="bg1"/>
+            </a:solidFill>
+          </a:ln>
+        </p:spPr>
+        <p:style>
+          <a:lnRef idx="2">
+            <a:schemeClr val="accent1">
+              <a:shade val="50000"/>
+            </a:schemeClr>
+          </a:lnRef>
+          <a:fillRef idx="1">
+            <a:schemeClr val="accent1"/>
+          </a:fillRef>
+          <a:effectRef idx="0">
+            <a:schemeClr val="accent1"/>
+          </a:effectRef>
+          <a:fontRef idx="minor">
+            <a:schemeClr val="lt1"/>
+          </a:fontRef>
+        </p:style>
+        <p:txBody>
+          <a:bodyPr rtlCol="0" anchor="ctr"/>
+          <a:lstStyle/>
+          <a:p>
+            <a:pPr algn="ctr"/>
+            <a:r>
+              <a:rPr lang="en-US" dirty="0" smtClean="0"/>
+              <a:t>Data</a:t>
+            </a:r>
+            <a:endParaRPr lang="en-US" dirty="0"/>
+          </a:p>
+        </p:txBody>
+      </p:sp>
+      <p:sp>
+        <p:nvSpPr>
+          <p:cNvPr id="18" name="Rectangle 17"/>
+          <p:cNvSpPr/>
+          <p:nvPr/>
+        </p:nvSpPr>
+        <p:spPr>
+          <a:xfrm>
+            <a:off x="3987210" y="2179673"/>
+            <a:ext cx="1339702" cy="531628"/>
+          </a:xfrm>
+          <a:prstGeom prst="rect">
+            <a:avLst/>
+          </a:prstGeom>
+          <a:solidFill>
+            <a:srgbClr val="00B050"/>
+          </a:solidFill>
+          <a:ln>
+            <a:solidFill>
+              <a:schemeClr val="bg1"/>
+            </a:solidFill>
+          </a:ln>
+        </p:spPr>
+        <p:style>
+          <a:lnRef idx="2">
+            <a:schemeClr val="accent1">
+              <a:shade val="50000"/>
+            </a:schemeClr>
+          </a:lnRef>
+          <a:fillRef idx="1">
+            <a:schemeClr val="accent1"/>
+          </a:fillRef>
+          <a:effectRef idx="0">
+            <a:schemeClr val="accent1"/>
+          </a:effectRef>
+          <a:fontRef idx="minor">
+            <a:schemeClr val="lt1"/>
+          </a:fontRef>
+        </p:style>
+        <p:txBody>
+          <a:bodyPr rtlCol="0" anchor="ctr"/>
+          <a:lstStyle/>
+          <a:p>
+            <a:pPr algn="ctr"/>
+            <a:r>
+              <a:rPr lang="en-US" dirty="0" smtClean="0"/>
+              <a:t>Descriptor</a:t>
+            </a:r>
+            <a:endParaRPr lang="en-US" dirty="0"/>
+          </a:p>
+        </p:txBody>
+      </p:sp>
+      <p:sp>
+        <p:nvSpPr>
+          <p:cNvPr id="19" name="Rectangle 18"/>
+          <p:cNvSpPr/>
+          <p:nvPr/>
+        </p:nvSpPr>
+        <p:spPr>
+          <a:xfrm>
+            <a:off x="3987210" y="2714576"/>
+            <a:ext cx="1339702" cy="531628"/>
+          </a:xfrm>
+          <a:prstGeom prst="rect">
+            <a:avLst/>
+          </a:prstGeom>
+          <a:solidFill>
+            <a:srgbClr val="00B050"/>
+          </a:solidFill>
+          <a:ln>
+            <a:solidFill>
+              <a:schemeClr val="bg1"/>
+            </a:solidFill>
+          </a:ln>
+        </p:spPr>
+        <p:style>
+          <a:lnRef idx="2">
+            <a:schemeClr val="accent1">
+              <a:shade val="50000"/>
+            </a:schemeClr>
+          </a:lnRef>
+          <a:fillRef idx="1">
+            <a:schemeClr val="accent1"/>
+          </a:fillRef>
+          <a:effectRef idx="0">
+            <a:schemeClr val="accent1"/>
+          </a:effectRef>
+          <a:fontRef idx="minor">
+            <a:schemeClr val="lt1"/>
+          </a:fontRef>
+        </p:style>
+        <p:txBody>
+          <a:bodyPr rtlCol="0" anchor="ctr"/>
+          <a:lstStyle/>
+          <a:p>
+            <a:pPr algn="ctr"/>
+            <a:r>
+              <a:rPr lang="en-US" dirty="0" smtClean="0"/>
+              <a:t>Descriptor</a:t>
+            </a:r>
+            <a:endParaRPr lang="en-US" dirty="0"/>
+          </a:p>
+        </p:txBody>
+      </p:sp>
+      <p:sp>
+        <p:nvSpPr>
+          <p:cNvPr id="20" name="Rectangle 19"/>
+          <p:cNvSpPr/>
+          <p:nvPr/>
+        </p:nvSpPr>
+        <p:spPr>
+          <a:xfrm>
+            <a:off x="3987210" y="3242929"/>
+            <a:ext cx="1339702" cy="531628"/>
+          </a:xfrm>
+          <a:prstGeom prst="rect">
+            <a:avLst/>
+          </a:prstGeom>
+          <a:solidFill>
+            <a:srgbClr val="00B050"/>
+          </a:solidFill>
+          <a:ln>
+            <a:solidFill>
+              <a:schemeClr val="bg1"/>
+            </a:solidFill>
+          </a:ln>
+        </p:spPr>
+        <p:style>
+          <a:lnRef idx="2">
+            <a:schemeClr val="accent1">
+              <a:shade val="50000"/>
+            </a:schemeClr>
+          </a:lnRef>
+          <a:fillRef idx="1">
+            <a:schemeClr val="accent1"/>
+          </a:fillRef>
+          <a:effectRef idx="0">
+            <a:schemeClr val="accent1"/>
+          </a:effectRef>
+          <a:fontRef idx="minor">
+            <a:schemeClr val="lt1"/>
+          </a:fontRef>
+        </p:style>
+        <p:txBody>
+          <a:bodyPr rtlCol="0" anchor="ctr"/>
+          <a:lstStyle/>
+          <a:p>
+            <a:pPr algn="ctr"/>
+            <a:r>
+              <a:rPr lang="en-US" dirty="0" smtClean="0"/>
+              <a:t>Descriptor</a:t>
+            </a:r>
+            <a:endParaRPr lang="en-US" dirty="0"/>
+          </a:p>
+        </p:txBody>
+      </p:sp>
+      <p:sp>
+        <p:nvSpPr>
+          <p:cNvPr id="21" name="Rectangle 20"/>
+          <p:cNvSpPr/>
+          <p:nvPr/>
+        </p:nvSpPr>
+        <p:spPr>
+          <a:xfrm>
+            <a:off x="3987210" y="3771282"/>
+            <a:ext cx="1339702" cy="531628"/>
+          </a:xfrm>
+          <a:prstGeom prst="rect">
+            <a:avLst/>
+          </a:prstGeom>
+          <a:solidFill>
+            <a:srgbClr val="00B050"/>
+          </a:solidFill>
+          <a:ln>
+            <a:solidFill>
+              <a:schemeClr val="bg1"/>
+            </a:solidFill>
+          </a:ln>
+        </p:spPr>
+        <p:style>
+          <a:lnRef idx="2">
+            <a:schemeClr val="accent1">
+              <a:shade val="50000"/>
+            </a:schemeClr>
+          </a:lnRef>
+          <a:fillRef idx="1">
+            <a:schemeClr val="accent1"/>
+          </a:fillRef>
+          <a:effectRef idx="0">
+            <a:schemeClr val="accent1"/>
+          </a:effectRef>
+          <a:fontRef idx="minor">
+            <a:schemeClr val="lt1"/>
+          </a:fontRef>
+        </p:style>
+        <p:txBody>
+          <a:bodyPr rtlCol="0" anchor="ctr"/>
+          <a:lstStyle/>
+          <a:p>
+            <a:pPr algn="ctr"/>
+            <a:r>
+              <a:rPr lang="en-US" dirty="0" smtClean="0"/>
+              <a:t>Descriptor</a:t>
+            </a:r>
+            <a:endParaRPr lang="en-US" dirty="0"/>
+          </a:p>
+        </p:txBody>
+      </p:sp>
+      <p:sp>
+        <p:nvSpPr>
+          <p:cNvPr id="22" name="Rectangle 21"/>
+          <p:cNvSpPr/>
+          <p:nvPr/>
+        </p:nvSpPr>
+        <p:spPr>
+          <a:xfrm>
+            <a:off x="3987210" y="5356341"/>
+            <a:ext cx="1339702" cy="531628"/>
+          </a:xfrm>
+          <a:prstGeom prst="rect">
+            <a:avLst/>
+          </a:prstGeom>
+          <a:solidFill>
+            <a:srgbClr val="00B050"/>
+          </a:solidFill>
+          <a:ln>
+            <a:solidFill>
+              <a:schemeClr val="bg1"/>
+            </a:solidFill>
+          </a:ln>
+        </p:spPr>
+        <p:style>
+          <a:lnRef idx="2">
+            <a:schemeClr val="accent1">
+              <a:shade val="50000"/>
+            </a:schemeClr>
+          </a:lnRef>
+          <a:fillRef idx="1">
+            <a:schemeClr val="accent1"/>
+          </a:fillRef>
+          <a:effectRef idx="0">
+            <a:schemeClr val="accent1"/>
+          </a:effectRef>
+          <a:fontRef idx="minor">
+            <a:schemeClr val="lt1"/>
+          </a:fontRef>
+        </p:style>
+        <p:txBody>
+          <a:bodyPr rtlCol="0" anchor="ctr"/>
+          <a:lstStyle/>
+          <a:p>
+            <a:pPr algn="ctr"/>
+            <a:r>
+              <a:rPr lang="en-US" dirty="0" smtClean="0"/>
+              <a:t>Descriptor</a:t>
+            </a:r>
+            <a:endParaRPr lang="en-US" dirty="0"/>
+          </a:p>
+        </p:txBody>
+      </p:sp>
+      <p:sp>
+        <p:nvSpPr>
+          <p:cNvPr id="23" name="Rectangle 22"/>
+          <p:cNvSpPr/>
+          <p:nvPr/>
+        </p:nvSpPr>
+        <p:spPr>
+          <a:xfrm>
+            <a:off x="3987210" y="4299635"/>
+            <a:ext cx="1339702" cy="531628"/>
+          </a:xfrm>
+          <a:prstGeom prst="rect">
+            <a:avLst/>
+          </a:prstGeom>
+          <a:solidFill>
+            <a:srgbClr val="00B050"/>
+          </a:solidFill>
+          <a:ln>
+            <a:solidFill>
+              <a:schemeClr val="bg1"/>
+            </a:solidFill>
+          </a:ln>
+        </p:spPr>
+        <p:style>
+          <a:lnRef idx="2">
+            <a:schemeClr val="accent1">
+              <a:shade val="50000"/>
+            </a:schemeClr>
+          </a:lnRef>
+          <a:fillRef idx="1">
+            <a:schemeClr val="accent1"/>
+          </a:fillRef>
+          <a:effectRef idx="0">
+            <a:schemeClr val="accent1"/>
+          </a:effectRef>
+          <a:fontRef idx="minor">
+            <a:schemeClr val="lt1"/>
+          </a:fontRef>
+        </p:style>
+        <p:txBody>
+          <a:bodyPr rtlCol="0" anchor="ctr"/>
+          <a:lstStyle/>
+          <a:p>
+            <a:pPr algn="ctr"/>
+            <a:r>
+              <a:rPr lang="en-US" dirty="0" smtClean="0"/>
+              <a:t>Descriptor</a:t>
+            </a:r>
+            <a:endParaRPr lang="en-US" dirty="0"/>
+          </a:p>
+        </p:txBody>
+      </p:sp>
+      <p:sp>
+        <p:nvSpPr>
+          <p:cNvPr id="24" name="Rectangle 23"/>
+          <p:cNvSpPr/>
+          <p:nvPr/>
+        </p:nvSpPr>
+        <p:spPr>
+          <a:xfrm>
+            <a:off x="3987210" y="4832972"/>
+            <a:ext cx="1339702" cy="531628"/>
+          </a:xfrm>
+          <a:prstGeom prst="rect">
+            <a:avLst/>
+          </a:prstGeom>
+          <a:solidFill>
+            <a:srgbClr val="00B050"/>
+          </a:solidFill>
+          <a:ln>
+            <a:solidFill>
+              <a:schemeClr val="bg1"/>
+            </a:solidFill>
+          </a:ln>
+        </p:spPr>
+        <p:style>
+          <a:lnRef idx="2">
+            <a:schemeClr val="accent1">
+              <a:shade val="50000"/>
+            </a:schemeClr>
+          </a:lnRef>
+          <a:fillRef idx="1">
+            <a:schemeClr val="accent1"/>
+          </a:fillRef>
+          <a:effectRef idx="0">
+            <a:schemeClr val="accent1"/>
+          </a:effectRef>
+          <a:fontRef idx="minor">
+            <a:schemeClr val="lt1"/>
+          </a:fontRef>
+        </p:style>
+        <p:txBody>
+          <a:bodyPr rtlCol="0" anchor="ctr"/>
+          <a:lstStyle/>
+          <a:p>
+            <a:pPr algn="ctr"/>
+            <a:r>
+              <a:rPr lang="en-US" dirty="0" smtClean="0"/>
+              <a:t>Descriptor</a:t>
+            </a:r>
+            <a:endParaRPr lang="en-US" dirty="0"/>
+          </a:p>
+        </p:txBody>
+      </p:sp>
+      <p:cxnSp>
+        <p:nvCxnSpPr>
+          <p:cNvPr id="26" name="Straight Arrow Connector 25"/>
+          <p:cNvCxnSpPr>
+            <a:stCxn id="7" idx="3"/>
+            <a:endCxn id="8" idx="1"/>
+          </p:cNvCxnSpPr>
+          <p:nvPr/>
+        </p:nvCxnSpPr>
+        <p:spPr>
+          <a:xfrm flipV="1">
+            <a:off x="5326912" y="1900759"/>
+            <a:ext cx="1344833" cy="13100"/>
+          </a:xfrm>
+          <a:prstGeom prst="straightConnector1">
+            <a:avLst/>
+          </a:prstGeom>
+          <a:ln>
+            <a:solidFill>
+              <a:schemeClr val="tx1"/>
+            </a:solidFill>
+            <a:tailEnd type="triangle"/>
+          </a:ln>
+        </p:spPr>
+        <p:style>
+          <a:lnRef idx="1">
+            <a:schemeClr val="accent1"/>
+          </a:lnRef>
+          <a:fillRef idx="0">
+            <a:schemeClr val="accent1"/>
+          </a:fillRef>
+          <a:effectRef idx="0">
+            <a:schemeClr val="accent1"/>
+          </a:effectRef>
+          <a:fontRef idx="minor">
+            <a:schemeClr val="tx1"/>
+          </a:fontRef>
+        </p:style>
+      </p:cxnSp>
+      <p:cxnSp>
+        <p:nvCxnSpPr>
+          <p:cNvPr id="28" name="Straight Arrow Connector 27"/>
+          <p:cNvCxnSpPr/>
+          <p:nvPr/>
+        </p:nvCxnSpPr>
+        <p:spPr>
+          <a:xfrm flipV="1">
+            <a:off x="5326911" y="2456422"/>
+            <a:ext cx="1344833" cy="13100"/>
+          </a:xfrm>
+          <a:prstGeom prst="straightConnector1">
+            <a:avLst/>
+          </a:prstGeom>
+          <a:ln>
+            <a:solidFill>
+              <a:schemeClr val="tx1"/>
+            </a:solidFill>
+            <a:tailEnd type="triangle"/>
+          </a:ln>
+        </p:spPr>
+        <p:style>
+          <a:lnRef idx="1">
+            <a:schemeClr val="accent1"/>
+          </a:lnRef>
+          <a:fillRef idx="0">
+            <a:schemeClr val="accent1"/>
+          </a:fillRef>
+          <a:effectRef idx="0">
+            <a:schemeClr val="accent1"/>
+          </a:effectRef>
+          <a:fontRef idx="minor">
+            <a:schemeClr val="tx1"/>
+          </a:fontRef>
+        </p:style>
+      </p:cxnSp>
+      <p:cxnSp>
+        <p:nvCxnSpPr>
+          <p:cNvPr id="29" name="Straight Arrow Connector 28"/>
+          <p:cNvCxnSpPr/>
+          <p:nvPr/>
+        </p:nvCxnSpPr>
+        <p:spPr>
+          <a:xfrm flipV="1">
+            <a:off x="5326910" y="2988199"/>
+            <a:ext cx="1344833" cy="13100"/>
+          </a:xfrm>
+          <a:prstGeom prst="straightConnector1">
+            <a:avLst/>
+          </a:prstGeom>
+          <a:ln>
+            <a:solidFill>
+              <a:schemeClr val="tx1"/>
+            </a:solidFill>
+            <a:tailEnd type="triangle"/>
+          </a:ln>
+        </p:spPr>
+        <p:style>
+          <a:lnRef idx="1">
+            <a:schemeClr val="accent1"/>
+          </a:lnRef>
+          <a:fillRef idx="0">
+            <a:schemeClr val="accent1"/>
+          </a:fillRef>
+          <a:effectRef idx="0">
+            <a:schemeClr val="accent1"/>
+          </a:effectRef>
+          <a:fontRef idx="minor">
+            <a:schemeClr val="tx1"/>
+          </a:fontRef>
+        </p:style>
+      </p:cxnSp>
+      <p:cxnSp>
+        <p:nvCxnSpPr>
+          <p:cNvPr id="30" name="Straight Arrow Connector 29"/>
+          <p:cNvCxnSpPr/>
+          <p:nvPr/>
+        </p:nvCxnSpPr>
+        <p:spPr>
+          <a:xfrm flipV="1">
+            <a:off x="5326909" y="3489093"/>
+            <a:ext cx="1344833" cy="13100"/>
+          </a:xfrm>
+          <a:prstGeom prst="straightConnector1">
+            <a:avLst/>
+          </a:prstGeom>
+          <a:ln>
+            <a:solidFill>
+              <a:schemeClr val="tx1"/>
+            </a:solidFill>
+            <a:tailEnd type="triangle"/>
+          </a:ln>
+        </p:spPr>
+        <p:style>
+          <a:lnRef idx="1">
+            <a:schemeClr val="accent1"/>
+          </a:lnRef>
+          <a:fillRef idx="0">
+            <a:schemeClr val="accent1"/>
+          </a:fillRef>
+          <a:effectRef idx="0">
+            <a:schemeClr val="accent1"/>
+          </a:effectRef>
+          <a:fontRef idx="minor">
+            <a:schemeClr val="tx1"/>
+          </a:fontRef>
+        </p:style>
+      </p:cxnSp>
+      <p:cxnSp>
+        <p:nvCxnSpPr>
+          <p:cNvPr id="31" name="Straight Arrow Connector 30"/>
+          <p:cNvCxnSpPr/>
+          <p:nvPr/>
+        </p:nvCxnSpPr>
+        <p:spPr>
+          <a:xfrm flipV="1">
+            <a:off x="5326908" y="4051455"/>
+            <a:ext cx="1344833" cy="13100"/>
+          </a:xfrm>
+          <a:prstGeom prst="straightConnector1">
+            <a:avLst/>
+          </a:prstGeom>
+          <a:ln>
+            <a:solidFill>
+              <a:schemeClr val="tx1"/>
+            </a:solidFill>
+            <a:tailEnd type="triangle"/>
+          </a:ln>
+        </p:spPr>
+        <p:style>
+          <a:lnRef idx="1">
+            <a:schemeClr val="accent1"/>
+          </a:lnRef>
+          <a:fillRef idx="0">
+            <a:schemeClr val="accent1"/>
+          </a:fillRef>
+          <a:effectRef idx="0">
+            <a:schemeClr val="accent1"/>
+          </a:effectRef>
+          <a:fontRef idx="minor">
+            <a:schemeClr val="tx1"/>
+          </a:fontRef>
+        </p:style>
+      </p:cxnSp>
+      <p:cxnSp>
+        <p:nvCxnSpPr>
+          <p:cNvPr id="32" name="Straight Arrow Connector 31"/>
+          <p:cNvCxnSpPr/>
+          <p:nvPr/>
+        </p:nvCxnSpPr>
+        <p:spPr>
+          <a:xfrm flipV="1">
+            <a:off x="5326908" y="4593567"/>
+            <a:ext cx="1344833" cy="13100"/>
+          </a:xfrm>
+          <a:prstGeom prst="straightConnector1">
+            <a:avLst/>
+          </a:prstGeom>
+          <a:ln>
+            <a:solidFill>
+              <a:schemeClr val="tx1"/>
+            </a:solidFill>
+            <a:tailEnd type="triangle"/>
+          </a:ln>
+        </p:spPr>
+        <p:style>
+          <a:lnRef idx="1">
+            <a:schemeClr val="accent1"/>
+          </a:lnRef>
+          <a:fillRef idx="0">
+            <a:schemeClr val="accent1"/>
+          </a:fillRef>
+          <a:effectRef idx="0">
+            <a:schemeClr val="accent1"/>
+          </a:effectRef>
+          <a:fontRef idx="minor">
+            <a:schemeClr val="tx1"/>
+          </a:fontRef>
+        </p:style>
+      </p:cxnSp>
+      <p:cxnSp>
+        <p:nvCxnSpPr>
+          <p:cNvPr id="33" name="Straight Arrow Connector 32"/>
+          <p:cNvCxnSpPr/>
+          <p:nvPr/>
+        </p:nvCxnSpPr>
+        <p:spPr>
+          <a:xfrm flipV="1">
+            <a:off x="5326906" y="5081865"/>
+            <a:ext cx="1344833" cy="13100"/>
+          </a:xfrm>
+          <a:prstGeom prst="straightConnector1">
+            <a:avLst/>
+          </a:prstGeom>
+          <a:ln>
+            <a:solidFill>
+              <a:schemeClr val="tx1"/>
+            </a:solidFill>
+            <a:tailEnd type="triangle"/>
+          </a:ln>
+        </p:spPr>
+        <p:style>
+          <a:lnRef idx="1">
+            <a:schemeClr val="accent1"/>
+          </a:lnRef>
+          <a:fillRef idx="0">
+            <a:schemeClr val="accent1"/>
+          </a:fillRef>
+          <a:effectRef idx="0">
+            <a:schemeClr val="accent1"/>
+          </a:effectRef>
+          <a:fontRef idx="minor">
+            <a:schemeClr val="tx1"/>
+          </a:fontRef>
+        </p:style>
+      </p:cxnSp>
+      <p:cxnSp>
+        <p:nvCxnSpPr>
+          <p:cNvPr id="34" name="Straight Arrow Connector 33"/>
+          <p:cNvCxnSpPr/>
+          <p:nvPr/>
+        </p:nvCxnSpPr>
+        <p:spPr>
+          <a:xfrm flipV="1">
+            <a:off x="5326906" y="5603161"/>
+            <a:ext cx="1344833" cy="13100"/>
+          </a:xfrm>
+          <a:prstGeom prst="straightConnector1">
+            <a:avLst/>
+          </a:prstGeom>
+          <a:ln>
+            <a:solidFill>
+              <a:schemeClr val="tx1"/>
+            </a:solidFill>
+            <a:tailEnd type="triangle"/>
+          </a:ln>
+        </p:spPr>
+        <p:style>
+          <a:lnRef idx="1">
+            <a:schemeClr val="accent1"/>
+          </a:lnRef>
+          <a:fillRef idx="0">
+            <a:schemeClr val="accent1"/>
+          </a:fillRef>
+          <a:effectRef idx="0">
+            <a:schemeClr val="accent1"/>
+          </a:effectRef>
+          <a:fontRef idx="minor">
+            <a:schemeClr val="tx1"/>
+          </a:fontRef>
+        </p:style>
+      </p:cxnSp>
+    </p:spTree>
+    <p:extLst>
+      <p:ext uri="{BB962C8B-B14F-4D97-AF65-F5344CB8AC3E}">
+        <p14:creationId xmlns:p14="http://schemas.microsoft.com/office/powerpoint/2010/main" val="1805799832"/>
+      </p:ext>
+    </p:extLst>
+  </p:cSld>
+  <p:clrMapOvr>
+    <a:masterClrMapping/>
+  </p:clrMapOvr>
+  <p:timing>
+    <p:tnLst>
+      <p:par>
+        <p:cTn id="1" dur="indefinite" restart="never" nodeType="tmRoot">
+          <p:childTnLst>
+            <p:seq concurrent="1" nextAc="seek">
+              <p:cTn id="2" dur="indefinite" nodeType="mainSeq">
+                <p:childTnLst>
+                  <p:par>
+                    <p:cTn id="3" fill="hold">
+                      <p:stCondLst>
+                        <p:cond delay="indefinite"/>
+                      </p:stCondLst>
+                      <p:childTnLst>
+                        <p:par>
+                          <p:cTn id="4" fill="hold">
+                            <p:stCondLst>
+                              <p:cond delay="0"/>
+                            </p:stCondLst>
+                            <p:childTnLst>
+                              <p:par>
+                                <p:cTn id="5" presetID="1" presetClass="emph" presetSubtype="2" fill="hold" nodeType="clickEffect">
+                                  <p:stCondLst>
+                                    <p:cond delay="0"/>
+                                  </p:stCondLst>
+                                  <p:childTnLst>
+                                    <p:animClr clrSpc="rgb" dir="cw">
+                                      <p:cBhvr>
+                                        <p:cTn id="6" dur="1000" fill="hold"/>
+                                        <p:tgtEl>
+                                          <p:spTgt spid="8"/>
+                                        </p:tgtEl>
+                                        <p:attrNameLst>
+                                          <p:attrName>fillcolor</p:attrName>
+                                        </p:attrNameLst>
+                                      </p:cBhvr>
+                                      <p:to>
+                                        <a:schemeClr val="accent2"/>
+                                      </p:to>
+                                    </p:animClr>
+                                    <p:set>
+                                      <p:cBhvr>
+                                        <p:cTn id="7" dur="1000" fill="hold"/>
+                                        <p:tgtEl>
+                                          <p:spTgt spid="8"/>
+                                        </p:tgtEl>
+                                        <p:attrNameLst>
+                                          <p:attrName>fill.type</p:attrName>
+                                        </p:attrNameLst>
+                                      </p:cBhvr>
+                                      <p:to>
+                                        <p:strVal val="solid"/>
+                                      </p:to>
+                                    </p:set>
+                                    <p:set>
+                                      <p:cBhvr>
+                                        <p:cTn id="8" dur="1000" fill="hold"/>
+                                        <p:tgtEl>
+                                          <p:spTgt spid="8"/>
+                                        </p:tgtEl>
+                                        <p:attrNameLst>
+                                          <p:attrName>fill.on</p:attrName>
+                                        </p:attrNameLst>
+                                      </p:cBhvr>
+                                      <p:to>
+                                        <p:strVal val="true"/>
+                                      </p:to>
+                                    </p:set>
+                                  </p:childTnLst>
+                                </p:cTn>
+                              </p:par>
+                            </p:childTnLst>
+                          </p:cTn>
+                        </p:par>
+                      </p:childTnLst>
+                    </p:cTn>
+                  </p:par>
+                  <p:par>
+                    <p:cTn id="9" fill="hold">
+                      <p:stCondLst>
+                        <p:cond delay="indefinite"/>
+                      </p:stCondLst>
+                      <p:childTnLst>
+                        <p:par>
+                          <p:cTn id="10" fill="hold">
+                            <p:stCondLst>
+                              <p:cond delay="0"/>
+                            </p:stCondLst>
+                            <p:childTnLst>
+                              <p:par>
+                                <p:cTn id="11" presetID="1" presetClass="emph" presetSubtype="2" fill="hold" nodeType="clickEffect">
+                                  <p:stCondLst>
+                                    <p:cond delay="0"/>
+                                  </p:stCondLst>
+                                  <p:childTnLst>
+                                    <p:animClr clrSpc="rgb" dir="cw">
+                                      <p:cBhvr>
+                                        <p:cTn id="12" dur="1000" fill="hold"/>
+                                        <p:tgtEl>
+                                          <p:spTgt spid="7"/>
+                                        </p:tgtEl>
+                                        <p:attrNameLst>
+                                          <p:attrName>fillcolor</p:attrName>
+                                        </p:attrNameLst>
+                                      </p:cBhvr>
+                                      <p:to>
+                                        <a:schemeClr val="accent2"/>
+                                      </p:to>
+                                    </p:animClr>
+                                    <p:set>
+                                      <p:cBhvr>
+                                        <p:cTn id="13" dur="1000" fill="hold"/>
+                                        <p:tgtEl>
+                                          <p:spTgt spid="7"/>
+                                        </p:tgtEl>
+                                        <p:attrNameLst>
+                                          <p:attrName>fill.type</p:attrName>
+                                        </p:attrNameLst>
+                                      </p:cBhvr>
+                                      <p:to>
+                                        <p:strVal val="solid"/>
+                                      </p:to>
+                                    </p:set>
+                                    <p:set>
+                                      <p:cBhvr>
+                                        <p:cTn id="14" dur="1000" fill="hold"/>
+                                        <p:tgtEl>
+                                          <p:spTgt spid="7"/>
+                                        </p:tgtEl>
+                                        <p:attrNameLst>
+                                          <p:attrName>fill.on</p:attrName>
+                                        </p:attrNameLst>
+                                      </p:cBhvr>
+                                      <p:to>
+                                        <p:strVal val="true"/>
+                                      </p:to>
+                                    </p:set>
+                                  </p:childTnLst>
+                                </p:cTn>
+                              </p:par>
+                            </p:childTnLst>
+                          </p:cTn>
+                        </p:par>
+                      </p:childTnLst>
+                    </p:cTn>
+                  </p:par>
+                  <p:par>
+                    <p:cTn id="15" fill="hold">
+                      <p:stCondLst>
+                        <p:cond delay="indefinite"/>
+                      </p:stCondLst>
+                      <p:childTnLst>
+                        <p:par>
+                          <p:cTn id="16" fill="hold">
+                            <p:stCondLst>
+                              <p:cond delay="0"/>
+                            </p:stCondLst>
+                            <p:childTnLst>
+                              <p:par>
+                                <p:cTn id="17" presetID="2" presetClass="exit" presetSubtype="9" fill="hold" grpId="0" nodeType="clickEffect">
+                                  <p:stCondLst>
+                                    <p:cond delay="0"/>
+                                  </p:stCondLst>
+                                  <p:childTnLst>
+                                    <p:anim calcmode="lin" valueType="num">
+                                      <p:cBhvr additive="base">
+                                        <p:cTn id="18" dur="1000"/>
+                                        <p:tgtEl>
+                                          <p:spTgt spid="8"/>
+                                        </p:tgtEl>
+                                        <p:attrNameLst>
+                                          <p:attrName>ppt_x</p:attrName>
+                                        </p:attrNameLst>
+                                      </p:cBhvr>
+                                      <p:tavLst>
+                                        <p:tav tm="0">
+                                          <p:val>
+                                            <p:strVal val="ppt_x"/>
+                                          </p:val>
+                                        </p:tav>
+                                        <p:tav tm="100000">
+                                          <p:val>
+                                            <p:strVal val="0-ppt_w/2"/>
+                                          </p:val>
+                                        </p:tav>
+                                      </p:tavLst>
+                                    </p:anim>
+                                    <p:anim calcmode="lin" valueType="num">
+                                      <p:cBhvr additive="base">
+                                        <p:cTn id="19" dur="1000"/>
+                                        <p:tgtEl>
+                                          <p:spTgt spid="8"/>
+                                        </p:tgtEl>
+                                        <p:attrNameLst>
+                                          <p:attrName>ppt_y</p:attrName>
+                                        </p:attrNameLst>
+                                      </p:cBhvr>
+                                      <p:tavLst>
+                                        <p:tav tm="0">
+                                          <p:val>
+                                            <p:strVal val="ppt_y"/>
+                                          </p:val>
+                                        </p:tav>
+                                        <p:tav tm="100000">
+                                          <p:val>
+                                            <p:strVal val="0-ppt_h/2"/>
+                                          </p:val>
+                                        </p:tav>
+                                      </p:tavLst>
+                                    </p:anim>
+                                    <p:set>
+                                      <p:cBhvr>
+                                        <p:cTn id="20" dur="1" fill="hold">
+                                          <p:stCondLst>
+                                            <p:cond delay="999"/>
+                                          </p:stCondLst>
+                                        </p:cTn>
+                                        <p:tgtEl>
+                                          <p:spTgt spid="8"/>
+                                        </p:tgtEl>
+                                        <p:attrNameLst>
+                                          <p:attrName>style.visibility</p:attrName>
+                                        </p:attrNameLst>
+                                      </p:cBhvr>
+                                      <p:to>
+                                        <p:strVal val="hidden"/>
+                                      </p:to>
+                                    </p:set>
+                                  </p:childTnLst>
+                                </p:cTn>
+                              </p:par>
+                            </p:childTnLst>
+                          </p:cTn>
+                        </p:par>
+                      </p:childTnLst>
+                    </p:cTn>
+                  </p:par>
+                  <p:par>
+                    <p:cTn id="21" fill="hold">
+                      <p:stCondLst>
+                        <p:cond delay="indefinite"/>
+                      </p:stCondLst>
+                      <p:childTnLst>
+                        <p:par>
+                          <p:cTn id="22" fill="hold">
+                            <p:stCondLst>
+                              <p:cond delay="0"/>
+                            </p:stCondLst>
+                            <p:childTnLst>
+                              <p:par>
+                                <p:cTn id="23" presetID="1" presetClass="emph" presetSubtype="2" fill="hold" grpId="1" nodeType="clickEffect">
+                                  <p:stCondLst>
+                                    <p:cond delay="0"/>
+                                  </p:stCondLst>
+                                  <p:childTnLst>
+                                    <p:animClr clrSpc="rgb" dir="cw">
+                                      <p:cBhvr>
+                                        <p:cTn id="24" dur="500" fill="hold"/>
+                                        <p:tgtEl>
+                                          <p:spTgt spid="8"/>
+                                        </p:tgtEl>
+                                        <p:attrNameLst>
+                                          <p:attrName>fillcolor</p:attrName>
+                                        </p:attrNameLst>
+                                      </p:cBhvr>
+                                      <p:to>
+                                        <a:schemeClr val="hlink"/>
+                                      </p:to>
+                                    </p:animClr>
+                                    <p:set>
+                                      <p:cBhvr>
+                                        <p:cTn id="25" dur="500" fill="hold"/>
+                                        <p:tgtEl>
+                                          <p:spTgt spid="8"/>
+                                        </p:tgtEl>
+                                        <p:attrNameLst>
+                                          <p:attrName>fill.type</p:attrName>
+                                        </p:attrNameLst>
+                                      </p:cBhvr>
+                                      <p:to>
+                                        <p:strVal val="solid"/>
+                                      </p:to>
+                                    </p:set>
+                                    <p:set>
+                                      <p:cBhvr>
+                                        <p:cTn id="26" dur="500" fill="hold"/>
+                                        <p:tgtEl>
+                                          <p:spTgt spid="8"/>
+                                        </p:tgtEl>
+                                        <p:attrNameLst>
+                                          <p:attrName>fill.on</p:attrName>
+                                        </p:attrNameLst>
+                                      </p:cBhvr>
+                                      <p:to>
+                                        <p:strVal val="true"/>
+                                      </p:to>
+                                    </p:set>
+                                  </p:childTnLst>
+                                </p:cTn>
+                              </p:par>
+                            </p:childTnLst>
+                          </p:cTn>
+                        </p:par>
+                      </p:childTnLst>
+                    </p:cTn>
+                  </p:par>
+                  <p:par>
+                    <p:cTn id="27" fill="hold">
+                      <p:stCondLst>
+                        <p:cond delay="indefinite"/>
+                      </p:stCondLst>
+                      <p:childTnLst>
+                        <p:par>
+                          <p:cTn id="28" fill="hold">
+                            <p:stCondLst>
+                              <p:cond delay="0"/>
+                            </p:stCondLst>
+                            <p:childTnLst>
+                              <p:par>
+                                <p:cTn id="29" presetID="2" presetClass="entr" presetSubtype="9" fill="hold" grpId="2" nodeType="clickEffect">
+                                  <p:stCondLst>
+                                    <p:cond delay="0"/>
+                                  </p:stCondLst>
+                                  <p:childTnLst>
+                                    <p:set>
+                                      <p:cBhvr>
+                                        <p:cTn id="30" dur="1" fill="hold">
+                                          <p:stCondLst>
+                                            <p:cond delay="0"/>
+                                          </p:stCondLst>
+                                        </p:cTn>
+                                        <p:tgtEl>
+                                          <p:spTgt spid="8"/>
+                                        </p:tgtEl>
+                                        <p:attrNameLst>
+                                          <p:attrName>style.visibility</p:attrName>
+                                        </p:attrNameLst>
+                                      </p:cBhvr>
+                                      <p:to>
+                                        <p:strVal val="visible"/>
+                                      </p:to>
+                                    </p:set>
+                                    <p:anim calcmode="lin" valueType="num">
+                                      <p:cBhvr additive="base">
+                                        <p:cTn id="31" dur="1000" fill="hold"/>
+                                        <p:tgtEl>
+                                          <p:spTgt spid="8"/>
+                                        </p:tgtEl>
+                                        <p:attrNameLst>
+                                          <p:attrName>ppt_x</p:attrName>
+                                        </p:attrNameLst>
+                                      </p:cBhvr>
+                                      <p:tavLst>
+                                        <p:tav tm="0">
+                                          <p:val>
+                                            <p:strVal val="0-#ppt_w/2"/>
+                                          </p:val>
+                                        </p:tav>
+                                        <p:tav tm="100000">
+                                          <p:val>
+                                            <p:strVal val="#ppt_x"/>
+                                          </p:val>
+                                        </p:tav>
+                                      </p:tavLst>
+                                    </p:anim>
+                                    <p:anim calcmode="lin" valueType="num">
+                                      <p:cBhvr additive="base">
+                                        <p:cTn id="32" dur="1000" fill="hold"/>
+                                        <p:tgtEl>
+                                          <p:spTgt spid="8"/>
+                                        </p:tgtEl>
+                                        <p:attrNameLst>
+                                          <p:attrName>ppt_y</p:attrName>
+                                        </p:attrNameLst>
+                                      </p:cBhvr>
+                                      <p:tavLst>
+                                        <p:tav tm="0">
+                                          <p:val>
+                                            <p:strVal val="0-#ppt_h/2"/>
+                                          </p:val>
+                                        </p:tav>
+                                        <p:tav tm="100000">
+                                          <p:val>
+                                            <p:strVal val="#ppt_y"/>
+                                          </p:val>
+                                        </p:tav>
+                                      </p:tavLst>
+                                    </p:anim>
+                                  </p:childTnLst>
+                                </p:cTn>
+                              </p:par>
+                            </p:childTnLst>
+                          </p:cTn>
+                        </p:par>
+                      </p:childTnLst>
+                    </p:cTn>
+                  </p:par>
+                </p:childTnLst>
+              </p:cTn>
+              <p:prevCondLst>
+                <p:cond evt="onPrev" delay="0">
+                  <p:tgtEl>
+                    <p:sldTgt/>
+                  </p:tgtEl>
+                </p:cond>
+              </p:prevCondLst>
+              <p:nextCondLst>
+                <p:cond evt="onNext" delay="0">
+                  <p:tgtEl>
+                    <p:sldTgt/>
+                  </p:tgtEl>
+                </p:cond>
+              </p:nextCondLst>
+            </p:seq>
+          </p:childTnLst>
+        </p:cTn>
+      </p:par>
+    </p:tnLst>
+    <p:bldLst>
+      <p:bldP spid="8" grpId="0" animBg="1"/>
+      <p:bldP spid="8" grpId="1" animBg="1"/>
+      <p:bldP spid="8" grpId="2" animBg="1"/>
+    </p:bldLst>
+  </p:timing>
+</p:sld>
+</file>
+
 <file path=ppt/slides/slide2.xml><?xml version="1.0" encoding="utf-8"?>
 <p:sld xmlns:a="http://schemas.openxmlformats.org/drawingml/2006/main" xmlns:r="http://schemas.openxmlformats.org/officeDocument/2006/relationships" xmlns:p="http://schemas.openxmlformats.org/presentationml/2006/main">
   <p:cSld>
@@ -6548,6 +11047,111 @@
               <a:rPr lang="en-US" dirty="0" smtClean="0"/>
               <a:t>Interrupting the Kernel</a:t>
             </a:r>
+            <a:endParaRPr lang="en-US" dirty="0"/>
+          </a:p>
+        </p:txBody>
+      </p:sp>
+      <p:sp>
+        <p:nvSpPr>
+          <p:cNvPr id="7" name="Content Placeholder 6"/>
+          <p:cNvSpPr>
+            <a:spLocks noGrp="1"/>
+          </p:cNvSpPr>
+          <p:nvPr>
+            <p:ph idx="1"/>
+          </p:nvPr>
+        </p:nvSpPr>
+        <p:spPr/>
+        <p:txBody>
+          <a:bodyPr/>
+          <a:lstStyle/>
+          <a:p>
+            <a:pPr marL="0" marR="0" lvl="0" indent="0" defTabSz="914400" eaLnBrk="1" fontAlgn="auto" latinLnBrk="0" hangingPunct="1">
+              <a:lnSpc>
+                <a:spcPct val="100000"/>
+              </a:lnSpc>
+              <a:spcBef>
+                <a:spcPts val="0"/>
+              </a:spcBef>
+              <a:spcAft>
+                <a:spcPts val="0"/>
+              </a:spcAft>
+              <a:buClrTx/>
+              <a:buSzTx/>
+              <a:buFontTx/>
+              <a:buNone/>
+              <a:tabLst/>
+              <a:defRPr/>
+            </a:pPr>
+            <a:r>
+              <a:rPr lang="en-US" dirty="0" smtClean="0"/>
+              <a:t>Significant source of asynchrony</a:t>
+            </a:r>
+          </a:p>
+          <a:p>
+            <a:pPr marL="0" marR="0" lvl="0" indent="0" defTabSz="914400" eaLnBrk="1" fontAlgn="auto" latinLnBrk="0" hangingPunct="1">
+              <a:lnSpc>
+                <a:spcPct val="100000"/>
+              </a:lnSpc>
+              <a:spcBef>
+                <a:spcPts val="0"/>
+              </a:spcBef>
+              <a:spcAft>
+                <a:spcPts val="0"/>
+              </a:spcAft>
+              <a:buClrTx/>
+              <a:buSzTx/>
+              <a:buFontTx/>
+              <a:buNone/>
+              <a:tabLst/>
+              <a:defRPr/>
+            </a:pPr>
+            <a:r>
+              <a:rPr lang="en-US" dirty="0" smtClean="0"/>
+              <a:t>Get this wrong and the game is over</a:t>
+            </a:r>
+          </a:p>
+          <a:p>
+            <a:pPr marL="0" marR="0" lvl="0" indent="0" defTabSz="914400" eaLnBrk="1" fontAlgn="auto" latinLnBrk="0" hangingPunct="1">
+              <a:lnSpc>
+                <a:spcPct val="100000"/>
+              </a:lnSpc>
+              <a:spcBef>
+                <a:spcPts val="0"/>
+              </a:spcBef>
+              <a:spcAft>
+                <a:spcPts val="0"/>
+              </a:spcAft>
+              <a:buClrTx/>
+              <a:buSzTx/>
+              <a:buFontTx/>
+              <a:buNone/>
+              <a:tabLst/>
+              <a:defRPr/>
+            </a:pPr>
+            <a:r>
+              <a:rPr lang="en-US" dirty="0" smtClean="0"/>
+              <a:t>Latency and bandwidth</a:t>
+            </a:r>
+          </a:p>
+          <a:p>
+            <a:pPr marL="0" marR="0" lvl="0" indent="0" defTabSz="914400" eaLnBrk="1" fontAlgn="auto" latinLnBrk="0" hangingPunct="1">
+              <a:lnSpc>
+                <a:spcPct val="100000"/>
+              </a:lnSpc>
+              <a:spcBef>
+                <a:spcPts val="0"/>
+              </a:spcBef>
+              <a:spcAft>
+                <a:spcPts val="0"/>
+              </a:spcAft>
+              <a:buClrTx/>
+              <a:buSzTx/>
+              <a:buFontTx/>
+              <a:buNone/>
+              <a:tabLst/>
+              <a:defRPr/>
+            </a:pPr>
             <a:endParaRPr lang="en-US" dirty="0"/>
           </a:p>
         </p:txBody>

</xml_diff>